<commit_message>
Additional tweaking for EventSourcing Live 2021
</commit_message>
<xml_diff>
--- a/Taming the Concurrency Crocodile.pptx
+++ b/Taming the Concurrency Crocodile.pptx
@@ -212,7 +212,7 @@
           <a:p>
             <a:fld id="{C6504432-BAC1-4395-A608-59253830E191}" type="datetimeFigureOut">
               <a:rPr lang="en-GB" smtClean="0"/>
-              <a:t>24/04/2021</a:t>
+              <a:t>24/08/2021</a:t>
             </a:fld>
             <a:endParaRPr lang="en-GB"/>
           </a:p>
@@ -1265,7 +1265,7 @@
           <a:p>
             <a:fld id="{E0B31583-24FC-41E2-9DAA-9F971D55503A}" type="datetimeFigureOut">
               <a:rPr lang="en-GB" smtClean="0"/>
-              <a:t>24/04/2021</a:t>
+              <a:t>24/08/2021</a:t>
             </a:fld>
             <a:endParaRPr lang="en-GB"/>
           </a:p>
@@ -1465,7 +1465,7 @@
           <a:p>
             <a:fld id="{E0B31583-24FC-41E2-9DAA-9F971D55503A}" type="datetimeFigureOut">
               <a:rPr lang="en-GB" smtClean="0"/>
-              <a:t>24/04/2021</a:t>
+              <a:t>24/08/2021</a:t>
             </a:fld>
             <a:endParaRPr lang="en-GB"/>
           </a:p>
@@ -1675,7 +1675,7 @@
           <a:p>
             <a:fld id="{E0B31583-24FC-41E2-9DAA-9F971D55503A}" type="datetimeFigureOut">
               <a:rPr lang="en-GB" smtClean="0"/>
-              <a:t>24/04/2021</a:t>
+              <a:t>24/08/2021</a:t>
             </a:fld>
             <a:endParaRPr lang="en-GB"/>
           </a:p>
@@ -1875,7 +1875,7 @@
           <a:p>
             <a:fld id="{E0B31583-24FC-41E2-9DAA-9F971D55503A}" type="datetimeFigureOut">
               <a:rPr lang="en-GB" smtClean="0"/>
-              <a:t>24/04/2021</a:t>
+              <a:t>24/08/2021</a:t>
             </a:fld>
             <a:endParaRPr lang="en-GB"/>
           </a:p>
@@ -2151,7 +2151,7 @@
           <a:p>
             <a:fld id="{E0B31583-24FC-41E2-9DAA-9F971D55503A}" type="datetimeFigureOut">
               <a:rPr lang="en-GB" smtClean="0"/>
-              <a:t>24/04/2021</a:t>
+              <a:t>24/08/2021</a:t>
             </a:fld>
             <a:endParaRPr lang="en-GB"/>
           </a:p>
@@ -2419,7 +2419,7 @@
           <a:p>
             <a:fld id="{E0B31583-24FC-41E2-9DAA-9F971D55503A}" type="datetimeFigureOut">
               <a:rPr lang="en-GB" smtClean="0"/>
-              <a:t>24/04/2021</a:t>
+              <a:t>24/08/2021</a:t>
             </a:fld>
             <a:endParaRPr lang="en-GB"/>
           </a:p>
@@ -2834,7 +2834,7 @@
           <a:p>
             <a:fld id="{E0B31583-24FC-41E2-9DAA-9F971D55503A}" type="datetimeFigureOut">
               <a:rPr lang="en-GB" smtClean="0"/>
-              <a:t>24/04/2021</a:t>
+              <a:t>24/08/2021</a:t>
             </a:fld>
             <a:endParaRPr lang="en-GB"/>
           </a:p>
@@ -2976,7 +2976,7 @@
           <a:p>
             <a:fld id="{E0B31583-24FC-41E2-9DAA-9F971D55503A}" type="datetimeFigureOut">
               <a:rPr lang="en-GB" smtClean="0"/>
-              <a:t>24/04/2021</a:t>
+              <a:t>24/08/2021</a:t>
             </a:fld>
             <a:endParaRPr lang="en-GB"/>
           </a:p>
@@ -3089,7 +3089,7 @@
           <a:p>
             <a:fld id="{E0B31583-24FC-41E2-9DAA-9F971D55503A}" type="datetimeFigureOut">
               <a:rPr lang="en-GB" smtClean="0"/>
-              <a:t>24/04/2021</a:t>
+              <a:t>24/08/2021</a:t>
             </a:fld>
             <a:endParaRPr lang="en-GB"/>
           </a:p>
@@ -3402,7 +3402,7 @@
           <a:p>
             <a:fld id="{E0B31583-24FC-41E2-9DAA-9F971D55503A}" type="datetimeFigureOut">
               <a:rPr lang="en-GB" smtClean="0"/>
-              <a:t>24/04/2021</a:t>
+              <a:t>24/08/2021</a:t>
             </a:fld>
             <a:endParaRPr lang="en-GB"/>
           </a:p>
@@ -3691,7 +3691,7 @@
           <a:p>
             <a:fld id="{E0B31583-24FC-41E2-9DAA-9F971D55503A}" type="datetimeFigureOut">
               <a:rPr lang="en-GB" smtClean="0"/>
-              <a:t>24/04/2021</a:t>
+              <a:t>24/08/2021</a:t>
             </a:fld>
             <a:endParaRPr lang="en-GB"/>
           </a:p>
@@ -3934,7 +3934,7 @@
           <a:p>
             <a:fld id="{E0B31583-24FC-41E2-9DAA-9F971D55503A}" type="datetimeFigureOut">
               <a:rPr lang="en-GB" smtClean="0"/>
-              <a:t>24/04/2021</a:t>
+              <a:t>24/08/2021</a:t>
             </a:fld>
             <a:endParaRPr lang="en-GB"/>
           </a:p>
@@ -5179,6 +5179,78 @@
           </a:fontRef>
         </p:style>
       </p:cxnSp>
+      <p:sp>
+        <p:nvSpPr>
+          <p:cNvPr id="12" name="TextBox 11">
+            <a:extLst>
+              <a:ext uri="{FF2B5EF4-FFF2-40B4-BE49-F238E27FC236}">
+                <a16:creationId xmlns:a16="http://schemas.microsoft.com/office/drawing/2014/main" id="{A72A56DA-B272-4636-A4D5-E8F779B2B969}"/>
+              </a:ext>
+            </a:extLst>
+          </p:cNvPr>
+          <p:cNvSpPr txBox="1"/>
+          <p:nvPr/>
+        </p:nvSpPr>
+        <p:spPr>
+          <a:xfrm>
+            <a:off x="2055223" y="5286103"/>
+            <a:ext cx="1429687" cy="369332"/>
+          </a:xfrm>
+          <a:prstGeom prst="rect">
+            <a:avLst/>
+          </a:prstGeom>
+          <a:noFill/>
+        </p:spPr>
+        <p:txBody>
+          <a:bodyPr wrap="none" rtlCol="0">
+            <a:spAutoFit/>
+          </a:bodyPr>
+          <a:lstStyle/>
+          <a:p>
+            <a:r>
+              <a:rPr lang="en-IE" dirty="0"/>
+              <a:t>&gt;&gt; projection</a:t>
+            </a:r>
+            <a:endParaRPr lang="en-GB" dirty="0"/>
+          </a:p>
+        </p:txBody>
+      </p:sp>
+      <p:sp>
+        <p:nvSpPr>
+          <p:cNvPr id="15" name="TextBox 14">
+            <a:extLst>
+              <a:ext uri="{FF2B5EF4-FFF2-40B4-BE49-F238E27FC236}">
+                <a16:creationId xmlns:a16="http://schemas.microsoft.com/office/drawing/2014/main" id="{96BBFCBF-07F4-4764-8DE4-1C7BD7575B0F}"/>
+              </a:ext>
+            </a:extLst>
+          </p:cNvPr>
+          <p:cNvSpPr txBox="1"/>
+          <p:nvPr/>
+        </p:nvSpPr>
+        <p:spPr>
+          <a:xfrm>
+            <a:off x="6792513" y="5286103"/>
+            <a:ext cx="1409040" cy="369332"/>
+          </a:xfrm>
+          <a:prstGeom prst="rect">
+            <a:avLst/>
+          </a:prstGeom>
+          <a:noFill/>
+        </p:spPr>
+        <p:txBody>
+          <a:bodyPr wrap="none" rtlCol="0">
+            <a:spAutoFit/>
+          </a:bodyPr>
+          <a:lstStyle/>
+          <a:p>
+            <a:r>
+              <a:rPr lang="en-IE" dirty="0"/>
+              <a:t>&gt;&gt; command</a:t>
+            </a:r>
+            <a:endParaRPr lang="en-GB" dirty="0"/>
+          </a:p>
+        </p:txBody>
+      </p:sp>
     </p:spTree>
     <p:extLst>
       <p:ext uri="{BB962C8B-B14F-4D97-AF65-F5344CB8AC3E}">
@@ -5263,6 +5335,141 @@
                                   </p:childTnLst>
                                 </p:cTn>
                               </p:par>
+                              <p:par>
+                                <p:cTn id="9" presetID="1" presetClass="entr" presetSubtype="0" fill="hold" grpId="0" nodeType="withEffect">
+                                  <p:stCondLst>
+                                    <p:cond delay="0"/>
+                                  </p:stCondLst>
+                                  <p:childTnLst>
+                                    <p:set>
+                                      <p:cBhvr>
+                                        <p:cTn id="10" dur="1" fill="hold">
+                                          <p:stCondLst>
+                                            <p:cond delay="0"/>
+                                          </p:stCondLst>
+                                        </p:cTn>
+                                        <p:tgtEl>
+                                          <p:spTgt spid="8"/>
+                                        </p:tgtEl>
+                                        <p:attrNameLst>
+                                          <p:attrName>style.visibility</p:attrName>
+                                        </p:attrNameLst>
+                                      </p:cBhvr>
+                                      <p:to>
+                                        <p:strVal val="visible"/>
+                                      </p:to>
+                                    </p:set>
+                                  </p:childTnLst>
+                                </p:cTn>
+                              </p:par>
+                              <p:par>
+                                <p:cTn id="11" presetID="1" presetClass="entr" presetSubtype="0" fill="hold" grpId="0" nodeType="withEffect">
+                                  <p:stCondLst>
+                                    <p:cond delay="0"/>
+                                  </p:stCondLst>
+                                  <p:childTnLst>
+                                    <p:set>
+                                      <p:cBhvr>
+                                        <p:cTn id="12" dur="1" fill="hold">
+                                          <p:stCondLst>
+                                            <p:cond delay="0"/>
+                                          </p:stCondLst>
+                                        </p:cTn>
+                                        <p:tgtEl>
+                                          <p:spTgt spid="6"/>
+                                        </p:tgtEl>
+                                        <p:attrNameLst>
+                                          <p:attrName>style.visibility</p:attrName>
+                                        </p:attrNameLst>
+                                      </p:cBhvr>
+                                      <p:to>
+                                        <p:strVal val="visible"/>
+                                      </p:to>
+                                    </p:set>
+                                  </p:childTnLst>
+                                </p:cTn>
+                              </p:par>
+                              <p:par>
+                                <p:cTn id="13" presetID="1" presetClass="entr" presetSubtype="0" fill="hold" grpId="0" nodeType="withEffect">
+                                  <p:stCondLst>
+                                    <p:cond delay="0"/>
+                                  </p:stCondLst>
+                                  <p:childTnLst>
+                                    <p:set>
+                                      <p:cBhvr>
+                                        <p:cTn id="14" dur="1" fill="hold">
+                                          <p:stCondLst>
+                                            <p:cond delay="0"/>
+                                          </p:stCondLst>
+                                        </p:cTn>
+                                        <p:tgtEl>
+                                          <p:spTgt spid="9"/>
+                                        </p:tgtEl>
+                                        <p:attrNameLst>
+                                          <p:attrName>style.visibility</p:attrName>
+                                        </p:attrNameLst>
+                                      </p:cBhvr>
+                                      <p:to>
+                                        <p:strVal val="visible"/>
+                                      </p:to>
+                                    </p:set>
+                                  </p:childTnLst>
+                                </p:cTn>
+                              </p:par>
+                              <p:par>
+                                <p:cTn id="15" presetID="1" presetClass="entr" presetSubtype="0" fill="hold" grpId="0" nodeType="withEffect">
+                                  <p:stCondLst>
+                                    <p:cond delay="0"/>
+                                  </p:stCondLst>
+                                  <p:childTnLst>
+                                    <p:set>
+                                      <p:cBhvr>
+                                        <p:cTn id="16" dur="1" fill="hold">
+                                          <p:stCondLst>
+                                            <p:cond delay="0"/>
+                                          </p:stCondLst>
+                                        </p:cTn>
+                                        <p:tgtEl>
+                                          <p:spTgt spid="10"/>
+                                        </p:tgtEl>
+                                        <p:attrNameLst>
+                                          <p:attrName>style.visibility</p:attrName>
+                                        </p:attrNameLst>
+                                      </p:cBhvr>
+                                      <p:to>
+                                        <p:strVal val="visible"/>
+                                      </p:to>
+                                    </p:set>
+                                  </p:childTnLst>
+                                </p:cTn>
+                              </p:par>
+                              <p:par>
+                                <p:cTn id="17" presetID="1" presetClass="entr" presetSubtype="0" fill="hold" grpId="0" nodeType="withEffect">
+                                  <p:stCondLst>
+                                    <p:cond delay="0"/>
+                                  </p:stCondLst>
+                                  <p:childTnLst>
+                                    <p:set>
+                                      <p:cBhvr>
+                                        <p:cTn id="18" dur="1" fill="hold">
+                                          <p:stCondLst>
+                                            <p:cond delay="0"/>
+                                          </p:stCondLst>
+                                        </p:cTn>
+                                        <p:tgtEl>
+                                          <p:spTgt spid="11"/>
+                                        </p:tgtEl>
+                                        <p:attrNameLst>
+                                          <p:attrName>style.visibility</p:attrName>
+                                        </p:attrNameLst>
+                                      </p:cBhvr>
+                                      <p:to>
+                                        <p:strVal val="visible"/>
+                                      </p:to>
+                                    </p:set>
+                                  </p:childTnLst>
+                                </p:cTn>
+                              </p:par>
                             </p:childTnLst>
                           </p:cTn>
                         </p:par>
@@ -5290,6 +5497,13 @@
         </p:cTn>
       </p:par>
     </p:tnLst>
+    <p:bldLst>
+      <p:bldP spid="8" grpId="0"/>
+      <p:bldP spid="6" grpId="0" animBg="1"/>
+      <p:bldP spid="9" grpId="0" animBg="1"/>
+      <p:bldP spid="10" grpId="0" animBg="1"/>
+      <p:bldP spid="11" grpId="0" animBg="1"/>
+    </p:bldLst>
   </p:timing>
 </p:sld>
 </file>
@@ -7211,11 +7425,10 @@
               <a:lumOff val="40000"/>
             </a:schemeClr>
           </a:solidFill>
-          <a:ln>
+          <a:ln w="28575">
             <a:solidFill>
-              <a:schemeClr val="accent2">
-                <a:lumMod val="60000"/>
-                <a:lumOff val="40000"/>
+              <a:schemeClr val="accent5">
+                <a:lumMod val="50000"/>
               </a:schemeClr>
             </a:solidFill>
           </a:ln>
@@ -8309,56 +8522,12 @@
           <a:chExt cx="0" cy="0"/>
         </a:xfrm>
       </p:grpSpPr>
-      <p:sp>
-        <p:nvSpPr>
-          <p:cNvPr id="2" name="Title 1">
-            <a:extLst>
-              <a:ext uri="{FF2B5EF4-FFF2-40B4-BE49-F238E27FC236}">
-                <a16:creationId xmlns:a16="http://schemas.microsoft.com/office/drawing/2014/main" id="{A93D67CF-F60A-43DE-B742-EC019B03B8B4}"/>
-              </a:ext>
-            </a:extLst>
-          </p:cNvPr>
-          <p:cNvSpPr>
-            <a:spLocks noGrp="1"/>
-          </p:cNvSpPr>
-          <p:nvPr>
-            <p:ph type="title"/>
-          </p:nvPr>
-        </p:nvSpPr>
-        <p:spPr>
-          <a:xfrm>
-            <a:off x="4130040" y="2074656"/>
-            <a:ext cx="3383943" cy="1932802"/>
-          </a:xfrm>
-        </p:spPr>
-        <p:txBody>
-          <a:bodyPr>
-            <a:normAutofit/>
-          </a:bodyPr>
-          <a:lstStyle/>
-          <a:p>
-            <a:r>
-              <a:rPr lang="en-IE" sz="8800" b="1" dirty="0"/>
-              <a:t>Q</a:t>
-            </a:r>
-            <a:r>
-              <a:rPr lang="en-IE" sz="8800" dirty="0"/>
-              <a:t> &amp; </a:t>
-            </a:r>
-            <a:r>
-              <a:rPr lang="en-IE" sz="8800" b="1" dirty="0"/>
-              <a:t>A</a:t>
-            </a:r>
-            <a:endParaRPr lang="en-GB" sz="8800" b="1" dirty="0"/>
-          </a:p>
-        </p:txBody>
-      </p:sp>
       <p:pic>
         <p:nvPicPr>
-          <p:cNvPr id="4" name="Picture 3">
-            <a:extLst>
-              <a:ext uri="{FF2B5EF4-FFF2-40B4-BE49-F238E27FC236}">
-                <a16:creationId xmlns:a16="http://schemas.microsoft.com/office/drawing/2014/main" id="{48D4F640-EC03-49A9-9C2A-BDEBC43AABA6}"/>
+          <p:cNvPr id="7" name="Picture 6" descr="Text&#10;&#10;Description automatically generated">
+            <a:extLst>
+              <a:ext uri="{FF2B5EF4-FFF2-40B4-BE49-F238E27FC236}">
+                <a16:creationId xmlns:a16="http://schemas.microsoft.com/office/drawing/2014/main" id="{3BC839DB-92B4-4F0F-A125-FD0B996E7DF5}"/>
               </a:ext>
             </a:extLst>
           </p:cNvPr>
@@ -8368,7 +8537,90 @@
           <p:nvPr/>
         </p:nvPicPr>
         <p:blipFill>
-          <a:blip r:embed="rId3"/>
+          <a:blip r:embed="rId3">
+            <a:extLst>
+              <a:ext uri="{28A0092B-C50C-407E-A947-70E740481C1C}">
+                <a14:useLocalDpi xmlns:a14="http://schemas.microsoft.com/office/drawing/2010/main" val="0"/>
+              </a:ext>
+              <a:ext uri="{837473B0-CC2E-450A-ABE3-18F120FF3D39}">
+                <a1611:picAttrSrcUrl xmlns:a1611="http://schemas.microsoft.com/office/drawing/2016/11/main" r:id="rId4"/>
+              </a:ext>
+            </a:extLst>
+          </a:blip>
+          <a:stretch>
+            <a:fillRect/>
+          </a:stretch>
+        </p:blipFill>
+        <p:spPr>
+          <a:xfrm>
+            <a:off x="0" y="3104987"/>
+            <a:ext cx="4699867" cy="3630464"/>
+          </a:xfrm>
+          <a:prstGeom prst="rect">
+            <a:avLst/>
+          </a:prstGeom>
+        </p:spPr>
+      </p:pic>
+      <p:sp>
+        <p:nvSpPr>
+          <p:cNvPr id="2" name="Title 1">
+            <a:extLst>
+              <a:ext uri="{FF2B5EF4-FFF2-40B4-BE49-F238E27FC236}">
+                <a16:creationId xmlns:a16="http://schemas.microsoft.com/office/drawing/2014/main" id="{A93D67CF-F60A-43DE-B742-EC019B03B8B4}"/>
+              </a:ext>
+            </a:extLst>
+          </p:cNvPr>
+          <p:cNvSpPr>
+            <a:spLocks noGrp="1"/>
+          </p:cNvSpPr>
+          <p:nvPr>
+            <p:ph type="title"/>
+          </p:nvPr>
+        </p:nvSpPr>
+        <p:spPr>
+          <a:xfrm>
+            <a:off x="4130040" y="2074656"/>
+            <a:ext cx="3383943" cy="1932802"/>
+          </a:xfrm>
+        </p:spPr>
+        <p:txBody>
+          <a:bodyPr>
+            <a:normAutofit/>
+          </a:bodyPr>
+          <a:lstStyle/>
+          <a:p>
+            <a:r>
+              <a:rPr lang="en-IE" sz="8800" b="1" dirty="0"/>
+              <a:t>Q</a:t>
+            </a:r>
+            <a:r>
+              <a:rPr lang="en-IE" sz="8800" dirty="0"/>
+              <a:t> &amp; </a:t>
+            </a:r>
+            <a:r>
+              <a:rPr lang="en-IE" sz="8800" b="1" dirty="0"/>
+              <a:t>A</a:t>
+            </a:r>
+            <a:endParaRPr lang="en-GB" sz="8800" b="1" dirty="0"/>
+          </a:p>
+        </p:txBody>
+      </p:sp>
+      <p:pic>
+        <p:nvPicPr>
+          <p:cNvPr id="4" name="Picture 3">
+            <a:extLst>
+              <a:ext uri="{FF2B5EF4-FFF2-40B4-BE49-F238E27FC236}">
+                <a16:creationId xmlns:a16="http://schemas.microsoft.com/office/drawing/2014/main" id="{48D4F640-EC03-49A9-9C2A-BDEBC43AABA6}"/>
+              </a:ext>
+            </a:extLst>
+          </p:cNvPr>
+          <p:cNvPicPr>
+            <a:picLocks noChangeAspect="1"/>
+          </p:cNvPicPr>
+          <p:nvPr/>
+        </p:nvPicPr>
+        <p:blipFill>
+          <a:blip r:embed="rId5"/>
           <a:stretch>
             <a:fillRect/>
           </a:stretch>

</xml_diff>

<commit_message>
How to detect a conflict
</commit_message>
<xml_diff>
--- a/Taming the Concurrency Crocodile.pptx
+++ b/Taming the Concurrency Crocodile.pptx
@@ -212,7 +212,7 @@
           <a:p>
             <a:fld id="{C6504432-BAC1-4395-A608-59253830E191}" type="datetimeFigureOut">
               <a:rPr lang="en-GB" smtClean="0"/>
-              <a:t>24/08/2021</a:t>
+              <a:t>07/09/2021</a:t>
             </a:fld>
             <a:endParaRPr lang="en-GB"/>
           </a:p>
@@ -732,6 +732,28 @@
           <a:p>
             <a:endParaRPr lang="en-GB" dirty="0"/>
           </a:p>
+          <a:p>
+            <a:r>
+              <a:rPr lang="en-GB" dirty="0"/>
+              <a:t>However both </a:t>
+            </a:r>
+            <a:r>
+              <a:rPr lang="en-GB" b="1" dirty="0"/>
+              <a:t>transactions</a:t>
+            </a:r>
+            <a:r>
+              <a:rPr lang="en-GB" dirty="0"/>
+              <a:t> and </a:t>
+            </a:r>
+            <a:r>
+              <a:rPr lang="en-GB" b="1" dirty="0"/>
+              <a:t>locks</a:t>
+            </a:r>
+            <a:r>
+              <a:rPr lang="en-GB" dirty="0"/>
+              <a:t> solve the concurrency problem by change prevention – which is not always something that your particular business can tolerate.  </a:t>
+            </a:r>
+          </a:p>
         </p:txBody>
       </p:sp>
       <p:sp>
@@ -816,7 +838,25 @@
           <a:p>
             <a:r>
               <a:rPr lang="en-IE" dirty="0"/>
-              <a:t>Sagas and concurrency error detection</a:t>
+              <a:t>An alternative is to allow the arrow of time to continue and check as, or after you have acted on the state whether that state was still valid.</a:t>
+            </a:r>
+          </a:p>
+          <a:p>
+            <a:endParaRPr lang="en-IE" dirty="0"/>
+          </a:p>
+          <a:p>
+            <a:r>
+              <a:rPr lang="en-IE" dirty="0"/>
+              <a:t>Step 1: Check if the state has changed.  In an event sourced system you can do this by retrieving the event number of the top event read while projecting the state and then comparing it against the top event when you come to write the event(s) that are the action and if they do not match you know that some concurrency issue has occurred.</a:t>
+            </a:r>
+          </a:p>
+          <a:p>
+            <a:endParaRPr lang="en-IE" dirty="0"/>
+          </a:p>
+          <a:p>
+            <a:r>
+              <a:rPr lang="en-IE" dirty="0"/>
+              <a:t>Step 2: Perform whatever compensating action is needed to undo the state change if it should not have been allowed to happen…</a:t>
             </a:r>
             <a:endParaRPr lang="en-GB" dirty="0"/>
           </a:p>
@@ -992,6 +1032,97 @@
           <a:bodyPr/>
           <a:lstStyle/>
           <a:p>
+            <a:r>
+              <a:rPr lang="en-IE" dirty="0"/>
+              <a:t>Of course </a:t>
+            </a:r>
+            <a:r>
+              <a:rPr lang="en-IE" b="1" dirty="0"/>
+              <a:t>it depends</a:t>
+            </a:r>
+            <a:r>
+              <a:rPr lang="en-IE" b="0" dirty="0"/>
+              <a:t>…</a:t>
+            </a:r>
+          </a:p>
+          <a:p>
+            <a:endParaRPr lang="en-IE" b="0" dirty="0"/>
+          </a:p>
+          <a:p>
+            <a:r>
+              <a:rPr lang="en-IE" b="0" dirty="0"/>
+              <a:t>If your system is a </a:t>
+            </a:r>
+            <a:r>
+              <a:rPr lang="en-IE" b="0" i="1" dirty="0"/>
+              <a:t>line of business</a:t>
+            </a:r>
+            <a:r>
+              <a:rPr lang="en-IE" b="0" i="0" dirty="0"/>
+              <a:t> type of system that has operates synchronously and the user interface is interacting with humans then one of the two </a:t>
+            </a:r>
+            <a:r>
+              <a:rPr lang="en-IE" b="0" i="1" dirty="0"/>
+              <a:t>change prevention</a:t>
+            </a:r>
+            <a:r>
+              <a:rPr lang="en-IE" b="0" i="0" dirty="0"/>
+              <a:t> strategies will be easiest.  In practice this would nearly always mean relying on </a:t>
+            </a:r>
+            <a:r>
+              <a:rPr lang="en-IE" b="1" i="0" dirty="0"/>
+              <a:t>transactions</a:t>
+            </a:r>
+            <a:r>
+              <a:rPr lang="en-IE" b="0" i="0" dirty="0"/>
+              <a:t> provided by the underlying storage technology.  </a:t>
+            </a:r>
+          </a:p>
+          <a:p>
+            <a:endParaRPr lang="en-IE" b="0" i="0" dirty="0"/>
+          </a:p>
+          <a:p>
+            <a:r>
+              <a:rPr lang="en-IE" b="0" i="0" dirty="0"/>
+              <a:t>The optimistic concurrency of an </a:t>
+            </a:r>
+            <a:r>
+              <a:rPr lang="en-IE" b="1" i="0" dirty="0"/>
+              <a:t>undo-redo-undo</a:t>
+            </a:r>
+            <a:r>
+              <a:rPr lang="en-IE" b="0" i="0" dirty="0"/>
+              <a:t> or </a:t>
+            </a:r>
+            <a:r>
+              <a:rPr lang="en-IE" b="1" i="0" dirty="0"/>
+              <a:t>saga</a:t>
+            </a:r>
+            <a:r>
+              <a:rPr lang="en-IE" b="0" i="0" dirty="0"/>
+              <a:t> process is a better option of asynchronous systems and anything connecting to </a:t>
+            </a:r>
+            <a:r>
+              <a:rPr lang="en-IE" b="1" i="0" dirty="0"/>
+              <a:t>wait intolerant</a:t>
+            </a:r>
+            <a:r>
+              <a:rPr lang="en-IE" b="0" i="0" dirty="0"/>
+              <a:t> systems.</a:t>
+            </a:r>
+          </a:p>
+          <a:p>
+            <a:endParaRPr lang="en-IE" b="0" i="0" dirty="0"/>
+          </a:p>
+          <a:p>
+            <a:r>
+              <a:rPr lang="en-IE" b="0" i="0" dirty="0"/>
+              <a:t>Rewriting the business rule to work behind the current state is, of course, something that needs to be discussed with the business but there are many business domains that have operated in a distributed model that already cater for this way </a:t>
+            </a:r>
+            <a:r>
+              <a:rPr lang="en-IE" b="0" i="0"/>
+              <a:t>of operating.  </a:t>
+            </a:r>
             <a:endParaRPr lang="en-GB" dirty="0"/>
           </a:p>
         </p:txBody>
@@ -1265,7 +1396,7 @@
           <a:p>
             <a:fld id="{E0B31583-24FC-41E2-9DAA-9F971D55503A}" type="datetimeFigureOut">
               <a:rPr lang="en-GB" smtClean="0"/>
-              <a:t>24/08/2021</a:t>
+              <a:t>07/09/2021</a:t>
             </a:fld>
             <a:endParaRPr lang="en-GB"/>
           </a:p>
@@ -1465,7 +1596,7 @@
           <a:p>
             <a:fld id="{E0B31583-24FC-41E2-9DAA-9F971D55503A}" type="datetimeFigureOut">
               <a:rPr lang="en-GB" smtClean="0"/>
-              <a:t>24/08/2021</a:t>
+              <a:t>07/09/2021</a:t>
             </a:fld>
             <a:endParaRPr lang="en-GB"/>
           </a:p>
@@ -1675,7 +1806,7 @@
           <a:p>
             <a:fld id="{E0B31583-24FC-41E2-9DAA-9F971D55503A}" type="datetimeFigureOut">
               <a:rPr lang="en-GB" smtClean="0"/>
-              <a:t>24/08/2021</a:t>
+              <a:t>07/09/2021</a:t>
             </a:fld>
             <a:endParaRPr lang="en-GB"/>
           </a:p>
@@ -1875,7 +2006,7 @@
           <a:p>
             <a:fld id="{E0B31583-24FC-41E2-9DAA-9F971D55503A}" type="datetimeFigureOut">
               <a:rPr lang="en-GB" smtClean="0"/>
-              <a:t>24/08/2021</a:t>
+              <a:t>07/09/2021</a:t>
             </a:fld>
             <a:endParaRPr lang="en-GB"/>
           </a:p>
@@ -2151,7 +2282,7 @@
           <a:p>
             <a:fld id="{E0B31583-24FC-41E2-9DAA-9F971D55503A}" type="datetimeFigureOut">
               <a:rPr lang="en-GB" smtClean="0"/>
-              <a:t>24/08/2021</a:t>
+              <a:t>07/09/2021</a:t>
             </a:fld>
             <a:endParaRPr lang="en-GB"/>
           </a:p>
@@ -2419,7 +2550,7 @@
           <a:p>
             <a:fld id="{E0B31583-24FC-41E2-9DAA-9F971D55503A}" type="datetimeFigureOut">
               <a:rPr lang="en-GB" smtClean="0"/>
-              <a:t>24/08/2021</a:t>
+              <a:t>07/09/2021</a:t>
             </a:fld>
             <a:endParaRPr lang="en-GB"/>
           </a:p>
@@ -2834,7 +2965,7 @@
           <a:p>
             <a:fld id="{E0B31583-24FC-41E2-9DAA-9F971D55503A}" type="datetimeFigureOut">
               <a:rPr lang="en-GB" smtClean="0"/>
-              <a:t>24/08/2021</a:t>
+              <a:t>07/09/2021</a:t>
             </a:fld>
             <a:endParaRPr lang="en-GB"/>
           </a:p>
@@ -2976,7 +3107,7 @@
           <a:p>
             <a:fld id="{E0B31583-24FC-41E2-9DAA-9F971D55503A}" type="datetimeFigureOut">
               <a:rPr lang="en-GB" smtClean="0"/>
-              <a:t>24/08/2021</a:t>
+              <a:t>07/09/2021</a:t>
             </a:fld>
             <a:endParaRPr lang="en-GB"/>
           </a:p>
@@ -3089,7 +3220,7 @@
           <a:p>
             <a:fld id="{E0B31583-24FC-41E2-9DAA-9F971D55503A}" type="datetimeFigureOut">
               <a:rPr lang="en-GB" smtClean="0"/>
-              <a:t>24/08/2021</a:t>
+              <a:t>07/09/2021</a:t>
             </a:fld>
             <a:endParaRPr lang="en-GB"/>
           </a:p>
@@ -3402,7 +3533,7 @@
           <a:p>
             <a:fld id="{E0B31583-24FC-41E2-9DAA-9F971D55503A}" type="datetimeFigureOut">
               <a:rPr lang="en-GB" smtClean="0"/>
-              <a:t>24/08/2021</a:t>
+              <a:t>07/09/2021</a:t>
             </a:fld>
             <a:endParaRPr lang="en-GB"/>
           </a:p>
@@ -3691,7 +3822,7 @@
           <a:p>
             <a:fld id="{E0B31583-24FC-41E2-9DAA-9F971D55503A}" type="datetimeFigureOut">
               <a:rPr lang="en-GB" smtClean="0"/>
-              <a:t>24/08/2021</a:t>
+              <a:t>07/09/2021</a:t>
             </a:fld>
             <a:endParaRPr lang="en-GB"/>
           </a:p>
@@ -3934,7 +4065,7 @@
           <a:p>
             <a:fld id="{E0B31583-24FC-41E2-9DAA-9F971D55503A}" type="datetimeFigureOut">
               <a:rPr lang="en-GB" smtClean="0"/>
-              <a:t>24/08/2021</a:t>
+              <a:t>07/09/2021</a:t>
             </a:fld>
             <a:endParaRPr lang="en-GB"/>
           </a:p>
@@ -4862,7 +4993,7 @@
         <p:spPr>
           <a:xfrm>
             <a:off x="5054108" y="3898961"/>
-            <a:ext cx="261610" cy="369332"/>
+            <a:ext cx="264816" cy="369332"/>
           </a:xfrm>
           <a:prstGeom prst="rect">
             <a:avLst/>
@@ -4876,10 +5007,10 @@
           <a:lstStyle/>
           <a:p>
             <a:r>
-              <a:rPr lang="en-IE" i="1" dirty="0"/>
+              <a:rPr lang="en-IE" b="1" i="1" dirty="0"/>
               <a:t>t</a:t>
             </a:r>
-            <a:endParaRPr lang="en-GB" i="1" dirty="0"/>
+            <a:endParaRPr lang="en-GB" b="1" i="1" dirty="0"/>
           </a:p>
         </p:txBody>
       </p:sp>
@@ -7804,6 +7935,102 @@
           </a:p>
         </p:txBody>
       </p:sp>
+      <p:sp>
+        <p:nvSpPr>
+          <p:cNvPr id="13" name="Thought Bubble: Cloud 12">
+            <a:extLst>
+              <a:ext uri="{FF2B5EF4-FFF2-40B4-BE49-F238E27FC236}">
+                <a16:creationId xmlns:a16="http://schemas.microsoft.com/office/drawing/2014/main" id="{61453F97-9441-430D-8740-83F5E2F3F27B}"/>
+              </a:ext>
+            </a:extLst>
+          </p:cNvPr>
+          <p:cNvSpPr/>
+          <p:nvPr/>
+        </p:nvSpPr>
+        <p:spPr>
+          <a:xfrm>
+            <a:off x="9154250" y="1973674"/>
+            <a:ext cx="2672862" cy="1590364"/>
+          </a:xfrm>
+          <a:prstGeom prst="cloudCallout">
+            <a:avLst/>
+          </a:prstGeom>
+        </p:spPr>
+        <p:style>
+          <a:lnRef idx="0">
+            <a:schemeClr val="accent6"/>
+          </a:lnRef>
+          <a:fillRef idx="3">
+            <a:schemeClr val="accent6"/>
+          </a:fillRef>
+          <a:effectRef idx="3">
+            <a:schemeClr val="accent6"/>
+          </a:effectRef>
+          <a:fontRef idx="minor">
+            <a:schemeClr val="lt1"/>
+          </a:fontRef>
+        </p:style>
+        <p:txBody>
+          <a:bodyPr rtlCol="0" anchor="ctr"/>
+          <a:lstStyle/>
+          <a:p>
+            <a:pPr algn="ctr"/>
+            <a:r>
+              <a:rPr lang="en-IE" dirty="0"/>
+              <a:t>How do I know if there has been any change?</a:t>
+            </a:r>
+            <a:endParaRPr lang="en-GB" dirty="0"/>
+          </a:p>
+        </p:txBody>
+      </p:sp>
+      <p:sp>
+        <p:nvSpPr>
+          <p:cNvPr id="15" name="Callout: Down Arrow 14">
+            <a:extLst>
+              <a:ext uri="{FF2B5EF4-FFF2-40B4-BE49-F238E27FC236}">
+                <a16:creationId xmlns:a16="http://schemas.microsoft.com/office/drawing/2014/main" id="{DCB382FA-DB69-406B-AF87-8B77A78F29FF}"/>
+              </a:ext>
+            </a:extLst>
+          </p:cNvPr>
+          <p:cNvSpPr/>
+          <p:nvPr/>
+        </p:nvSpPr>
+        <p:spPr>
+          <a:xfrm>
+            <a:off x="3010228" y="2211604"/>
+            <a:ext cx="1646893" cy="1166441"/>
+          </a:xfrm>
+          <a:prstGeom prst="downArrowCallout">
+            <a:avLst/>
+          </a:prstGeom>
+        </p:spPr>
+        <p:style>
+          <a:lnRef idx="0">
+            <a:schemeClr val="accent6"/>
+          </a:lnRef>
+          <a:fillRef idx="3">
+            <a:schemeClr val="accent6"/>
+          </a:fillRef>
+          <a:effectRef idx="3">
+            <a:schemeClr val="accent6"/>
+          </a:effectRef>
+          <a:fontRef idx="minor">
+            <a:schemeClr val="lt1"/>
+          </a:fontRef>
+        </p:style>
+        <p:txBody>
+          <a:bodyPr rtlCol="0" anchor="ctr"/>
+          <a:lstStyle/>
+          <a:p>
+            <a:pPr algn="ctr"/>
+            <a:r>
+              <a:rPr lang="en-IE" dirty="0"/>
+              <a:t>As at…</a:t>
+            </a:r>
+            <a:endParaRPr lang="en-GB" dirty="0"/>
+          </a:p>
+        </p:txBody>
+      </p:sp>
     </p:spTree>
     <p:extLst>
       <p:ext uri="{BB962C8B-B14F-4D97-AF65-F5344CB8AC3E}">
@@ -7814,6 +8041,130 @@
   <p:clrMapOvr>
     <a:masterClrMapping/>
   </p:clrMapOvr>
+  <p:timing>
+    <p:tnLst>
+      <p:par>
+        <p:cTn id="1" dur="indefinite" restart="never" nodeType="tmRoot">
+          <p:childTnLst>
+            <p:seq concurrent="1" nextAc="seek">
+              <p:cTn id="2" dur="indefinite" nodeType="mainSeq">
+                <p:childTnLst>
+                  <p:par>
+                    <p:cTn id="3" fill="hold">
+                      <p:stCondLst>
+                        <p:cond delay="indefinite"/>
+                      </p:stCondLst>
+                      <p:childTnLst>
+                        <p:par>
+                          <p:cTn id="4" fill="hold">
+                            <p:stCondLst>
+                              <p:cond delay="0"/>
+                            </p:stCondLst>
+                            <p:childTnLst>
+                              <p:par>
+                                <p:cTn id="5" presetID="1" presetClass="entr" presetSubtype="0" fill="hold" grpId="0" nodeType="clickEffect">
+                                  <p:stCondLst>
+                                    <p:cond delay="0"/>
+                                  </p:stCondLst>
+                                  <p:childTnLst>
+                                    <p:set>
+                                      <p:cBhvr>
+                                        <p:cTn id="6" dur="1" fill="hold">
+                                          <p:stCondLst>
+                                            <p:cond delay="0"/>
+                                          </p:stCondLst>
+                                        </p:cTn>
+                                        <p:tgtEl>
+                                          <p:spTgt spid="13"/>
+                                        </p:tgtEl>
+                                        <p:attrNameLst>
+                                          <p:attrName>style.visibility</p:attrName>
+                                        </p:attrNameLst>
+                                      </p:cBhvr>
+                                      <p:to>
+                                        <p:strVal val="visible"/>
+                                      </p:to>
+                                    </p:set>
+                                  </p:childTnLst>
+                                </p:cTn>
+                              </p:par>
+                            </p:childTnLst>
+                          </p:cTn>
+                        </p:par>
+                      </p:childTnLst>
+                    </p:cTn>
+                  </p:par>
+                  <p:par>
+                    <p:cTn id="7" fill="hold">
+                      <p:stCondLst>
+                        <p:cond delay="indefinite"/>
+                      </p:stCondLst>
+                      <p:childTnLst>
+                        <p:par>
+                          <p:cTn id="8" fill="hold">
+                            <p:stCondLst>
+                              <p:cond delay="0"/>
+                            </p:stCondLst>
+                            <p:childTnLst>
+                              <p:par>
+                                <p:cTn id="9" presetID="1" presetClass="entr" presetSubtype="0" fill="hold" grpId="0" nodeType="clickEffect">
+                                  <p:stCondLst>
+                                    <p:cond delay="0"/>
+                                  </p:stCondLst>
+                                  <p:childTnLst>
+                                    <p:set>
+                                      <p:cBhvr>
+                                        <p:cTn id="10" dur="1" fill="hold">
+                                          <p:stCondLst>
+                                            <p:cond delay="0"/>
+                                          </p:stCondLst>
+                                        </p:cTn>
+                                        <p:tgtEl>
+                                          <p:spTgt spid="15"/>
+                                        </p:tgtEl>
+                                        <p:attrNameLst>
+                                          <p:attrName>style.visibility</p:attrName>
+                                        </p:attrNameLst>
+                                      </p:cBhvr>
+                                      <p:to>
+                                        <p:strVal val="visible"/>
+                                      </p:to>
+                                    </p:set>
+                                  </p:childTnLst>
+                                </p:cTn>
+                              </p:par>
+                            </p:childTnLst>
+                          </p:cTn>
+                        </p:par>
+                      </p:childTnLst>
+                    </p:cTn>
+                  </p:par>
+                </p:childTnLst>
+              </p:cTn>
+              <p:prevCondLst>
+                <p:cond evt="onPrev" delay="0">
+                  <p:tgtEl>
+                    <p:sldTgt/>
+                  </p:tgtEl>
+                </p:cond>
+              </p:prevCondLst>
+              <p:nextCondLst>
+                <p:cond evt="onNext" delay="0">
+                  <p:tgtEl>
+                    <p:sldTgt/>
+                  </p:tgtEl>
+                </p:cond>
+              </p:nextCondLst>
+            </p:seq>
+          </p:childTnLst>
+        </p:cTn>
+      </p:par>
+    </p:tnLst>
+    <p:bldLst>
+      <p:bldP spid="13" grpId="0" animBg="1"/>
+      <p:bldP spid="15" grpId="0" animBg="1"/>
+    </p:bldLst>
+  </p:timing>
 </p:sld>
 </file>
 

</xml_diff>

<commit_message>
Additional options for dealing with concurrency
</commit_message>
<xml_diff>
--- a/Taming the Concurrency Crocodile.pptx
+++ b/Taming the Concurrency Crocodile.pptx
@@ -5,7 +5,7 @@
     <p:sldMasterId id="2147483648" r:id="rId1"/>
   </p:sldMasterIdLst>
   <p:notesMasterIdLst>
-    <p:notesMasterId r:id="rId10"/>
+    <p:notesMasterId r:id="rId12"/>
   </p:notesMasterIdLst>
   <p:sldIdLst>
     <p:sldId id="256" r:id="rId2"/>
@@ -13,9 +13,11 @@
     <p:sldId id="263" r:id="rId4"/>
     <p:sldId id="258" r:id="rId5"/>
     <p:sldId id="259" r:id="rId6"/>
-    <p:sldId id="260" r:id="rId7"/>
-    <p:sldId id="261" r:id="rId8"/>
-    <p:sldId id="262" r:id="rId9"/>
+    <p:sldId id="264" r:id="rId7"/>
+    <p:sldId id="260" r:id="rId8"/>
+    <p:sldId id="261" r:id="rId9"/>
+    <p:sldId id="265" r:id="rId10"/>
+    <p:sldId id="262" r:id="rId11"/>
   </p:sldIdLst>
   <p:sldSz cx="12192000" cy="6858000"/>
   <p:notesSz cx="6858000" cy="9144000"/>
@@ -212,7 +214,7 @@
           <a:p>
             <a:fld id="{C6504432-BAC1-4395-A608-59253830E191}" type="datetimeFigureOut">
               <a:rPr lang="en-GB" smtClean="0"/>
-              <a:t>07/09/2021</a:t>
+              <a:t>21/09/2021</a:t>
             </a:fld>
             <a:endParaRPr lang="en-GB"/>
           </a:p>
@@ -526,7 +528,7 @@
           <a:p>
             <a:r>
               <a:rPr lang="en-IE" dirty="0"/>
-              <a:t>At the most basic level every business process being executed on a computer program can be distilled down to two parts:</a:t>
+              <a:t>At the most basic level nearly every business process being executed on a computer program can be distilled down to two parts:</a:t>
             </a:r>
             <a:br>
               <a:rPr lang="en-IE" dirty="0"/>
@@ -540,12 +542,26 @@
             </a:br>
             <a:r>
               <a:rPr lang="en-IE" dirty="0"/>
-              <a:t>2) Do some action based on that </a:t>
-            </a:r>
-            <a:r>
-              <a:rPr lang="en-IE"/>
-              <a:t>current state</a:t>
-            </a:r>
+              <a:t>2) Do some action based on that current state</a:t>
+            </a:r>
+          </a:p>
+          <a:p>
+            <a:endParaRPr lang="en-IE" dirty="0"/>
+          </a:p>
+          <a:p>
+            <a:r>
+              <a:rPr lang="en-IE" dirty="0"/>
+              <a:t>The problem is that in a multi-threaded, multi user, multi everything world the state may change </a:t>
+            </a:r>
+            <a:r>
+              <a:rPr lang="en-IE" i="1" dirty="0"/>
+              <a:t>in the </a:t>
+            </a:r>
+            <a:r>
+              <a:rPr lang="en-IE" i="1"/>
+              <a:t>time it takes us to act on it.</a:t>
+            </a:r>
+            <a:endParaRPr lang="en-IE" dirty="0"/>
           </a:p>
         </p:txBody>
       </p:sp>
@@ -944,10 +960,26 @@
           <a:p>
             <a:r>
               <a:rPr lang="en-IE" dirty="0"/>
-              <a:t>Changing business conditions for “is” to “was”</a:t>
-            </a:r>
-          </a:p>
-          <a:p>
+              <a:t>An alternative is to allow the arrow of time to continue and check as, or after you have acted on the state whether that state was still valid.</a:t>
+            </a:r>
+          </a:p>
+          <a:p>
+            <a:endParaRPr lang="en-IE" dirty="0"/>
+          </a:p>
+          <a:p>
+            <a:r>
+              <a:rPr lang="en-IE" dirty="0"/>
+              <a:t>Step 1: Check if the state has changed.  In an event sourced system you can do this by retrieving the event number of the top event read while projecting the state and then comparing it against the top event when you come to write the event(s) that are the action and if they do not match you know that some concurrency issue has occurred.</a:t>
+            </a:r>
+          </a:p>
+          <a:p>
+            <a:endParaRPr lang="en-IE" dirty="0"/>
+          </a:p>
+          <a:p>
+            <a:r>
+              <a:rPr lang="en-IE" dirty="0"/>
+              <a:t>Step 2: If the state has changed, don’t apply the action but rather try the whole command again</a:t>
+            </a:r>
             <a:endParaRPr lang="en-GB" dirty="0"/>
           </a:p>
         </p:txBody>
@@ -978,7 +1010,7 @@
     </p:spTree>
     <p:extLst>
       <p:ext uri="{BB962C8B-B14F-4D97-AF65-F5344CB8AC3E}">
-        <p14:creationId xmlns:p14="http://schemas.microsoft.com/office/powerpoint/2010/main" val="570922166"/>
+        <p14:creationId xmlns:p14="http://schemas.microsoft.com/office/powerpoint/2010/main" val="1372094485"/>
       </p:ext>
     </p:extLst>
   </p:cSld>
@@ -1034,95 +1066,10 @@
           <a:p>
             <a:r>
               <a:rPr lang="en-IE" dirty="0"/>
-              <a:t>Of course </a:t>
-            </a:r>
-            <a:r>
-              <a:rPr lang="en-IE" b="1" dirty="0"/>
-              <a:t>it depends</a:t>
-            </a:r>
-            <a:r>
-              <a:rPr lang="en-IE" b="0" dirty="0"/>
-              <a:t>…</a:t>
-            </a:r>
-          </a:p>
-          <a:p>
-            <a:endParaRPr lang="en-IE" b="0" dirty="0"/>
-          </a:p>
-          <a:p>
-            <a:r>
-              <a:rPr lang="en-IE" b="0" dirty="0"/>
-              <a:t>If your system is a </a:t>
-            </a:r>
-            <a:r>
-              <a:rPr lang="en-IE" b="0" i="1" dirty="0"/>
-              <a:t>line of business</a:t>
-            </a:r>
-            <a:r>
-              <a:rPr lang="en-IE" b="0" i="0" dirty="0"/>
-              <a:t> type of system that has operates synchronously and the user interface is interacting with humans then one of the two </a:t>
-            </a:r>
-            <a:r>
-              <a:rPr lang="en-IE" b="0" i="1" dirty="0"/>
-              <a:t>change prevention</a:t>
-            </a:r>
-            <a:r>
-              <a:rPr lang="en-IE" b="0" i="0" dirty="0"/>
-              <a:t> strategies will be easiest.  In practice this would nearly always mean relying on </a:t>
-            </a:r>
-            <a:r>
-              <a:rPr lang="en-IE" b="1" i="0" dirty="0"/>
-              <a:t>transactions</a:t>
-            </a:r>
-            <a:r>
-              <a:rPr lang="en-IE" b="0" i="0" dirty="0"/>
-              <a:t> provided by the underlying storage technology.  </a:t>
-            </a:r>
-          </a:p>
-          <a:p>
-            <a:endParaRPr lang="en-IE" b="0" i="0" dirty="0"/>
-          </a:p>
-          <a:p>
-            <a:r>
-              <a:rPr lang="en-IE" b="0" i="0" dirty="0"/>
-              <a:t>The optimistic concurrency of an </a:t>
-            </a:r>
-            <a:r>
-              <a:rPr lang="en-IE" b="1" i="0" dirty="0"/>
-              <a:t>undo-redo-undo</a:t>
-            </a:r>
-            <a:r>
-              <a:rPr lang="en-IE" b="0" i="0" dirty="0"/>
-              <a:t> or </a:t>
-            </a:r>
-            <a:r>
-              <a:rPr lang="en-IE" b="1" i="0" dirty="0"/>
-              <a:t>saga</a:t>
-            </a:r>
-            <a:r>
-              <a:rPr lang="en-IE" b="0" i="0" dirty="0"/>
-              <a:t> process is a better option of asynchronous systems and anything connecting to </a:t>
-            </a:r>
-            <a:r>
-              <a:rPr lang="en-IE" b="1" i="0" dirty="0"/>
-              <a:t>wait intolerant</a:t>
-            </a:r>
-            <a:r>
-              <a:rPr lang="en-IE" b="0" i="0" dirty="0"/>
-              <a:t> systems.</a:t>
-            </a:r>
-          </a:p>
-          <a:p>
-            <a:endParaRPr lang="en-IE" b="0" i="0" dirty="0"/>
-          </a:p>
-          <a:p>
-            <a:r>
-              <a:rPr lang="en-IE" b="0" i="0" dirty="0"/>
-              <a:t>Rewriting the business rule to work behind the current state is, of course, something that needs to be discussed with the business but there are many business domains that have operated in a distributed model that already cater for this way </a:t>
-            </a:r>
-            <a:r>
-              <a:rPr lang="en-IE" b="0" i="0"/>
-              <a:t>of operating.  </a:t>
-            </a:r>
+              <a:t>Changing business conditions for “is” to “was”</a:t>
+            </a:r>
+          </a:p>
+          <a:p>
             <a:endParaRPr lang="en-GB" dirty="0"/>
           </a:p>
         </p:txBody>
@@ -1153,7 +1100,7 @@
     </p:spTree>
     <p:extLst>
       <p:ext uri="{BB962C8B-B14F-4D97-AF65-F5344CB8AC3E}">
-        <p14:creationId xmlns:p14="http://schemas.microsoft.com/office/powerpoint/2010/main" val="964935376"/>
+        <p14:creationId xmlns:p14="http://schemas.microsoft.com/office/powerpoint/2010/main" val="570922166"/>
       </p:ext>
     </p:extLst>
   </p:cSld>
@@ -1207,6 +1154,97 @@
           <a:bodyPr/>
           <a:lstStyle/>
           <a:p>
+            <a:r>
+              <a:rPr lang="en-IE" dirty="0"/>
+              <a:t>Of course </a:t>
+            </a:r>
+            <a:r>
+              <a:rPr lang="en-IE" b="1" dirty="0"/>
+              <a:t>it depends</a:t>
+            </a:r>
+            <a:r>
+              <a:rPr lang="en-IE" b="0" dirty="0"/>
+              <a:t>…</a:t>
+            </a:r>
+          </a:p>
+          <a:p>
+            <a:endParaRPr lang="en-IE" b="0" dirty="0"/>
+          </a:p>
+          <a:p>
+            <a:r>
+              <a:rPr lang="en-IE" b="0" dirty="0"/>
+              <a:t>If your system is a </a:t>
+            </a:r>
+            <a:r>
+              <a:rPr lang="en-IE" b="0" i="1" dirty="0"/>
+              <a:t>line of business</a:t>
+            </a:r>
+            <a:r>
+              <a:rPr lang="en-IE" b="0" i="0" dirty="0"/>
+              <a:t> type of system that has operates synchronously and the user interface is interacting with humans then one of the two </a:t>
+            </a:r>
+            <a:r>
+              <a:rPr lang="en-IE" b="0" i="1" dirty="0"/>
+              <a:t>change prevention</a:t>
+            </a:r>
+            <a:r>
+              <a:rPr lang="en-IE" b="0" i="0" dirty="0"/>
+              <a:t> strategies will be easiest.  In practice this would nearly always mean relying on </a:t>
+            </a:r>
+            <a:r>
+              <a:rPr lang="en-IE" b="1" i="0" dirty="0"/>
+              <a:t>transactions</a:t>
+            </a:r>
+            <a:r>
+              <a:rPr lang="en-IE" b="0" i="0" dirty="0"/>
+              <a:t> provided by the underlying storage technology.  </a:t>
+            </a:r>
+          </a:p>
+          <a:p>
+            <a:endParaRPr lang="en-IE" b="0" i="0" dirty="0"/>
+          </a:p>
+          <a:p>
+            <a:r>
+              <a:rPr lang="en-IE" b="0" i="0" dirty="0"/>
+              <a:t>The optimistic concurrency of an </a:t>
+            </a:r>
+            <a:r>
+              <a:rPr lang="en-IE" b="1" i="0" dirty="0"/>
+              <a:t>undo-redo-undo</a:t>
+            </a:r>
+            <a:r>
+              <a:rPr lang="en-IE" b="0" i="0" dirty="0"/>
+              <a:t> or </a:t>
+            </a:r>
+            <a:r>
+              <a:rPr lang="en-IE" b="1" i="0" dirty="0"/>
+              <a:t>saga</a:t>
+            </a:r>
+            <a:r>
+              <a:rPr lang="en-IE" b="0" i="0" dirty="0"/>
+              <a:t> process is a better option of asynchronous systems and anything connecting to </a:t>
+            </a:r>
+            <a:r>
+              <a:rPr lang="en-IE" b="1" i="0" dirty="0"/>
+              <a:t>wait intolerant</a:t>
+            </a:r>
+            <a:r>
+              <a:rPr lang="en-IE" b="0" i="0" dirty="0"/>
+              <a:t> systems.</a:t>
+            </a:r>
+          </a:p>
+          <a:p>
+            <a:endParaRPr lang="en-IE" b="0" i="0" dirty="0"/>
+          </a:p>
+          <a:p>
+            <a:r>
+              <a:rPr lang="en-IE" b="0" i="0" dirty="0"/>
+              <a:t>Rewriting the business rule to work behind the current state is, of course, something that needs to be discussed with the business but there are many business domains that have operated in a distributed model that already cater for this way </a:t>
+            </a:r>
+            <a:r>
+              <a:rPr lang="en-IE" b="0" i="0"/>
+              <a:t>of operating.  </a:t>
+            </a:r>
             <a:endParaRPr lang="en-GB" dirty="0"/>
           </a:p>
         </p:txBody>
@@ -1229,6 +1267,174 @@
             <a:fld id="{5A14177E-C38F-4072-AB4F-46BD16343C4A}" type="slidenum">
               <a:rPr lang="en-GB" smtClean="0"/>
               <a:t>8</a:t>
+            </a:fld>
+            <a:endParaRPr lang="en-GB"/>
+          </a:p>
+        </p:txBody>
+      </p:sp>
+    </p:spTree>
+    <p:extLst>
+      <p:ext uri="{BB962C8B-B14F-4D97-AF65-F5344CB8AC3E}">
+        <p14:creationId xmlns:p14="http://schemas.microsoft.com/office/powerpoint/2010/main" val="964935376"/>
+      </p:ext>
+    </p:extLst>
+  </p:cSld>
+  <p:clrMapOvr>
+    <a:masterClrMapping/>
+  </p:clrMapOvr>
+</p:notes>
+</file>
+
+<file path=ppt/notesSlides/notesSlide8.xml><?xml version="1.0" encoding="utf-8"?>
+<p:notes xmlns:a="http://schemas.openxmlformats.org/drawingml/2006/main" xmlns:r="http://schemas.openxmlformats.org/officeDocument/2006/relationships" xmlns:p="http://schemas.openxmlformats.org/presentationml/2006/main">
+  <p:cSld>
+    <p:spTree>
+      <p:nvGrpSpPr>
+        <p:cNvPr id="1" name=""/>
+        <p:cNvGrpSpPr/>
+        <p:nvPr/>
+      </p:nvGrpSpPr>
+      <p:grpSpPr>
+        <a:xfrm>
+          <a:off x="0" y="0"/>
+          <a:ext cx="0" cy="0"/>
+          <a:chOff x="0" y="0"/>
+          <a:chExt cx="0" cy="0"/>
+        </a:xfrm>
+      </p:grpSpPr>
+      <p:sp>
+        <p:nvSpPr>
+          <p:cNvPr id="2" name="Slide Image Placeholder 1"/>
+          <p:cNvSpPr>
+            <a:spLocks noGrp="1" noRot="1" noChangeAspect="1"/>
+          </p:cNvSpPr>
+          <p:nvPr>
+            <p:ph type="sldImg"/>
+          </p:nvPr>
+        </p:nvSpPr>
+        <p:spPr/>
+      </p:sp>
+      <p:sp>
+        <p:nvSpPr>
+          <p:cNvPr id="3" name="Notes Placeholder 2"/>
+          <p:cNvSpPr>
+            <a:spLocks noGrp="1"/>
+          </p:cNvSpPr>
+          <p:nvPr>
+            <p:ph type="body" idx="1"/>
+          </p:nvPr>
+        </p:nvSpPr>
+        <p:spPr/>
+        <p:txBody>
+          <a:bodyPr/>
+          <a:lstStyle/>
+          <a:p>
+            <a:endParaRPr lang="en-GB" dirty="0"/>
+          </a:p>
+        </p:txBody>
+      </p:sp>
+      <p:sp>
+        <p:nvSpPr>
+          <p:cNvPr id="4" name="Slide Number Placeholder 3"/>
+          <p:cNvSpPr>
+            <a:spLocks noGrp="1"/>
+          </p:cNvSpPr>
+          <p:nvPr>
+            <p:ph type="sldNum" sz="quarter" idx="5"/>
+          </p:nvPr>
+        </p:nvSpPr>
+        <p:spPr/>
+        <p:txBody>
+          <a:bodyPr/>
+          <a:lstStyle/>
+          <a:p>
+            <a:fld id="{5A14177E-C38F-4072-AB4F-46BD16343C4A}" type="slidenum">
+              <a:rPr lang="en-GB" smtClean="0"/>
+              <a:t>9</a:t>
+            </a:fld>
+            <a:endParaRPr lang="en-GB"/>
+          </a:p>
+        </p:txBody>
+      </p:sp>
+    </p:spTree>
+    <p:extLst>
+      <p:ext uri="{BB962C8B-B14F-4D97-AF65-F5344CB8AC3E}">
+        <p14:creationId xmlns:p14="http://schemas.microsoft.com/office/powerpoint/2010/main" val="64536566"/>
+      </p:ext>
+    </p:extLst>
+  </p:cSld>
+  <p:clrMapOvr>
+    <a:masterClrMapping/>
+  </p:clrMapOvr>
+</p:notes>
+</file>
+
+<file path=ppt/notesSlides/notesSlide9.xml><?xml version="1.0" encoding="utf-8"?>
+<p:notes xmlns:a="http://schemas.openxmlformats.org/drawingml/2006/main" xmlns:r="http://schemas.openxmlformats.org/officeDocument/2006/relationships" xmlns:p="http://schemas.openxmlformats.org/presentationml/2006/main">
+  <p:cSld>
+    <p:spTree>
+      <p:nvGrpSpPr>
+        <p:cNvPr id="1" name=""/>
+        <p:cNvGrpSpPr/>
+        <p:nvPr/>
+      </p:nvGrpSpPr>
+      <p:grpSpPr>
+        <a:xfrm>
+          <a:off x="0" y="0"/>
+          <a:ext cx="0" cy="0"/>
+          <a:chOff x="0" y="0"/>
+          <a:chExt cx="0" cy="0"/>
+        </a:xfrm>
+      </p:grpSpPr>
+      <p:sp>
+        <p:nvSpPr>
+          <p:cNvPr id="2" name="Slide Image Placeholder 1"/>
+          <p:cNvSpPr>
+            <a:spLocks noGrp="1" noRot="1" noChangeAspect="1"/>
+          </p:cNvSpPr>
+          <p:nvPr>
+            <p:ph type="sldImg"/>
+          </p:nvPr>
+        </p:nvSpPr>
+        <p:spPr/>
+      </p:sp>
+      <p:sp>
+        <p:nvSpPr>
+          <p:cNvPr id="3" name="Notes Placeholder 2"/>
+          <p:cNvSpPr>
+            <a:spLocks noGrp="1"/>
+          </p:cNvSpPr>
+          <p:nvPr>
+            <p:ph type="body" idx="1"/>
+          </p:nvPr>
+        </p:nvSpPr>
+        <p:spPr/>
+        <p:txBody>
+          <a:bodyPr/>
+          <a:lstStyle/>
+          <a:p>
+            <a:endParaRPr lang="en-GB" dirty="0"/>
+          </a:p>
+        </p:txBody>
+      </p:sp>
+      <p:sp>
+        <p:nvSpPr>
+          <p:cNvPr id="4" name="Slide Number Placeholder 3"/>
+          <p:cNvSpPr>
+            <a:spLocks noGrp="1"/>
+          </p:cNvSpPr>
+          <p:nvPr>
+            <p:ph type="sldNum" sz="quarter" idx="5"/>
+          </p:nvPr>
+        </p:nvSpPr>
+        <p:spPr/>
+        <p:txBody>
+          <a:bodyPr/>
+          <a:lstStyle/>
+          <a:p>
+            <a:fld id="{5A14177E-C38F-4072-AB4F-46BD16343C4A}" type="slidenum">
+              <a:rPr lang="en-GB" smtClean="0"/>
+              <a:t>10</a:t>
             </a:fld>
             <a:endParaRPr lang="en-GB"/>
           </a:p>
@@ -1396,7 +1602,7 @@
           <a:p>
             <a:fld id="{E0B31583-24FC-41E2-9DAA-9F971D55503A}" type="datetimeFigureOut">
               <a:rPr lang="en-GB" smtClean="0"/>
-              <a:t>07/09/2021</a:t>
+              <a:t>21/09/2021</a:t>
             </a:fld>
             <a:endParaRPr lang="en-GB"/>
           </a:p>
@@ -1596,7 +1802,7 @@
           <a:p>
             <a:fld id="{E0B31583-24FC-41E2-9DAA-9F971D55503A}" type="datetimeFigureOut">
               <a:rPr lang="en-GB" smtClean="0"/>
-              <a:t>07/09/2021</a:t>
+              <a:t>21/09/2021</a:t>
             </a:fld>
             <a:endParaRPr lang="en-GB"/>
           </a:p>
@@ -1806,7 +2012,7 @@
           <a:p>
             <a:fld id="{E0B31583-24FC-41E2-9DAA-9F971D55503A}" type="datetimeFigureOut">
               <a:rPr lang="en-GB" smtClean="0"/>
-              <a:t>07/09/2021</a:t>
+              <a:t>21/09/2021</a:t>
             </a:fld>
             <a:endParaRPr lang="en-GB"/>
           </a:p>
@@ -2006,7 +2212,7 @@
           <a:p>
             <a:fld id="{E0B31583-24FC-41E2-9DAA-9F971D55503A}" type="datetimeFigureOut">
               <a:rPr lang="en-GB" smtClean="0"/>
-              <a:t>07/09/2021</a:t>
+              <a:t>21/09/2021</a:t>
             </a:fld>
             <a:endParaRPr lang="en-GB"/>
           </a:p>
@@ -2282,7 +2488,7 @@
           <a:p>
             <a:fld id="{E0B31583-24FC-41E2-9DAA-9F971D55503A}" type="datetimeFigureOut">
               <a:rPr lang="en-GB" smtClean="0"/>
-              <a:t>07/09/2021</a:t>
+              <a:t>21/09/2021</a:t>
             </a:fld>
             <a:endParaRPr lang="en-GB"/>
           </a:p>
@@ -2550,7 +2756,7 @@
           <a:p>
             <a:fld id="{E0B31583-24FC-41E2-9DAA-9F971D55503A}" type="datetimeFigureOut">
               <a:rPr lang="en-GB" smtClean="0"/>
-              <a:t>07/09/2021</a:t>
+              <a:t>21/09/2021</a:t>
             </a:fld>
             <a:endParaRPr lang="en-GB"/>
           </a:p>
@@ -2965,7 +3171,7 @@
           <a:p>
             <a:fld id="{E0B31583-24FC-41E2-9DAA-9F971D55503A}" type="datetimeFigureOut">
               <a:rPr lang="en-GB" smtClean="0"/>
-              <a:t>07/09/2021</a:t>
+              <a:t>21/09/2021</a:t>
             </a:fld>
             <a:endParaRPr lang="en-GB"/>
           </a:p>
@@ -3107,7 +3313,7 @@
           <a:p>
             <a:fld id="{E0B31583-24FC-41E2-9DAA-9F971D55503A}" type="datetimeFigureOut">
               <a:rPr lang="en-GB" smtClean="0"/>
-              <a:t>07/09/2021</a:t>
+              <a:t>21/09/2021</a:t>
             </a:fld>
             <a:endParaRPr lang="en-GB"/>
           </a:p>
@@ -3220,7 +3426,7 @@
           <a:p>
             <a:fld id="{E0B31583-24FC-41E2-9DAA-9F971D55503A}" type="datetimeFigureOut">
               <a:rPr lang="en-GB" smtClean="0"/>
-              <a:t>07/09/2021</a:t>
+              <a:t>21/09/2021</a:t>
             </a:fld>
             <a:endParaRPr lang="en-GB"/>
           </a:p>
@@ -3533,7 +3739,7 @@
           <a:p>
             <a:fld id="{E0B31583-24FC-41E2-9DAA-9F971D55503A}" type="datetimeFigureOut">
               <a:rPr lang="en-GB" smtClean="0"/>
-              <a:t>07/09/2021</a:t>
+              <a:t>21/09/2021</a:t>
             </a:fld>
             <a:endParaRPr lang="en-GB"/>
           </a:p>
@@ -3822,7 +4028,7 @@
           <a:p>
             <a:fld id="{E0B31583-24FC-41E2-9DAA-9F971D55503A}" type="datetimeFigureOut">
               <a:rPr lang="en-GB" smtClean="0"/>
-              <a:t>07/09/2021</a:t>
+              <a:t>21/09/2021</a:t>
             </a:fld>
             <a:endParaRPr lang="en-GB"/>
           </a:p>
@@ -4065,7 +4271,7 @@
           <a:p>
             <a:fld id="{E0B31583-24FC-41E2-9DAA-9F971D55503A}" type="datetimeFigureOut">
               <a:rPr lang="en-GB" smtClean="0"/>
-              <a:t>07/09/2021</a:t>
+              <a:t>21/09/2021</a:t>
             </a:fld>
             <a:endParaRPr lang="en-GB"/>
           </a:p>
@@ -4752,6 +4958,149 @@
 </p:sld>
 </file>
 
+<file path=ppt/slides/slide10.xml><?xml version="1.0" encoding="utf-8"?>
+<p:sld xmlns:a="http://schemas.openxmlformats.org/drawingml/2006/main" xmlns:r="http://schemas.openxmlformats.org/officeDocument/2006/relationships" xmlns:p="http://schemas.openxmlformats.org/presentationml/2006/main">
+  <p:cSld>
+    <p:spTree>
+      <p:nvGrpSpPr>
+        <p:cNvPr id="1" name=""/>
+        <p:cNvGrpSpPr/>
+        <p:nvPr/>
+      </p:nvGrpSpPr>
+      <p:grpSpPr>
+        <a:xfrm>
+          <a:off x="0" y="0"/>
+          <a:ext cx="0" cy="0"/>
+          <a:chOff x="0" y="0"/>
+          <a:chExt cx="0" cy="0"/>
+        </a:xfrm>
+      </p:grpSpPr>
+      <p:pic>
+        <p:nvPicPr>
+          <p:cNvPr id="7" name="Picture 6" descr="Text&#10;&#10;Description automatically generated">
+            <a:extLst>
+              <a:ext uri="{FF2B5EF4-FFF2-40B4-BE49-F238E27FC236}">
+                <a16:creationId xmlns:a16="http://schemas.microsoft.com/office/drawing/2014/main" id="{3BC839DB-92B4-4F0F-A125-FD0B996E7DF5}"/>
+              </a:ext>
+            </a:extLst>
+          </p:cNvPr>
+          <p:cNvPicPr>
+            <a:picLocks noChangeAspect="1"/>
+          </p:cNvPicPr>
+          <p:nvPr/>
+        </p:nvPicPr>
+        <p:blipFill>
+          <a:blip r:embed="rId3">
+            <a:extLst>
+              <a:ext uri="{28A0092B-C50C-407E-A947-70E740481C1C}">
+                <a14:useLocalDpi xmlns:a14="http://schemas.microsoft.com/office/drawing/2010/main" val="0"/>
+              </a:ext>
+              <a:ext uri="{837473B0-CC2E-450A-ABE3-18F120FF3D39}">
+                <a1611:picAttrSrcUrl xmlns:a1611="http://schemas.microsoft.com/office/drawing/2016/11/main" r:id="rId4"/>
+              </a:ext>
+            </a:extLst>
+          </a:blip>
+          <a:stretch>
+            <a:fillRect/>
+          </a:stretch>
+        </p:blipFill>
+        <p:spPr>
+          <a:xfrm>
+            <a:off x="0" y="3104987"/>
+            <a:ext cx="4699867" cy="3630464"/>
+          </a:xfrm>
+          <a:prstGeom prst="rect">
+            <a:avLst/>
+          </a:prstGeom>
+        </p:spPr>
+      </p:pic>
+      <p:sp>
+        <p:nvSpPr>
+          <p:cNvPr id="2" name="Title 1">
+            <a:extLst>
+              <a:ext uri="{FF2B5EF4-FFF2-40B4-BE49-F238E27FC236}">
+                <a16:creationId xmlns:a16="http://schemas.microsoft.com/office/drawing/2014/main" id="{A93D67CF-F60A-43DE-B742-EC019B03B8B4}"/>
+              </a:ext>
+            </a:extLst>
+          </p:cNvPr>
+          <p:cNvSpPr>
+            <a:spLocks noGrp="1"/>
+          </p:cNvSpPr>
+          <p:nvPr>
+            <p:ph type="title"/>
+          </p:nvPr>
+        </p:nvSpPr>
+        <p:spPr>
+          <a:xfrm>
+            <a:off x="4130040" y="2074656"/>
+            <a:ext cx="3383943" cy="1932802"/>
+          </a:xfrm>
+        </p:spPr>
+        <p:txBody>
+          <a:bodyPr>
+            <a:normAutofit/>
+          </a:bodyPr>
+          <a:lstStyle/>
+          <a:p>
+            <a:r>
+              <a:rPr lang="en-IE" sz="8800" b="1" dirty="0"/>
+              <a:t>Q</a:t>
+            </a:r>
+            <a:r>
+              <a:rPr lang="en-IE" sz="8800" dirty="0"/>
+              <a:t> &amp; </a:t>
+            </a:r>
+            <a:r>
+              <a:rPr lang="en-IE" sz="8800" b="1" dirty="0"/>
+              <a:t>A</a:t>
+            </a:r>
+            <a:endParaRPr lang="en-GB" sz="8800" b="1" dirty="0"/>
+          </a:p>
+        </p:txBody>
+      </p:sp>
+      <p:pic>
+        <p:nvPicPr>
+          <p:cNvPr id="4" name="Picture 3">
+            <a:extLst>
+              <a:ext uri="{FF2B5EF4-FFF2-40B4-BE49-F238E27FC236}">
+                <a16:creationId xmlns:a16="http://schemas.microsoft.com/office/drawing/2014/main" id="{48D4F640-EC03-49A9-9C2A-BDEBC43AABA6}"/>
+              </a:ext>
+            </a:extLst>
+          </p:cNvPr>
+          <p:cNvPicPr>
+            <a:picLocks noChangeAspect="1"/>
+          </p:cNvPicPr>
+          <p:nvPr/>
+        </p:nvPicPr>
+        <p:blipFill>
+          <a:blip r:embed="rId5"/>
+          <a:stretch>
+            <a:fillRect/>
+          </a:stretch>
+        </p:blipFill>
+        <p:spPr>
+          <a:xfrm>
+            <a:off x="10039048" y="161457"/>
+            <a:ext cx="1978023" cy="1732898"/>
+          </a:xfrm>
+          <a:prstGeom prst="rect">
+            <a:avLst/>
+          </a:prstGeom>
+        </p:spPr>
+      </p:pic>
+    </p:spTree>
+    <p:extLst>
+      <p:ext uri="{BB962C8B-B14F-4D97-AF65-F5344CB8AC3E}">
+        <p14:creationId xmlns:p14="http://schemas.microsoft.com/office/powerpoint/2010/main" val="3044768823"/>
+      </p:ext>
+    </p:extLst>
+  </p:cSld>
+  <p:clrMapOvr>
+    <a:masterClrMapping/>
+  </p:clrMapOvr>
+</p:sld>
+</file>
+
 <file path=ppt/slides/slide2.xml><?xml version="1.0" encoding="utf-8"?>
 <p:sld xmlns:a="http://schemas.openxmlformats.org/drawingml/2006/main" xmlns:r="http://schemas.openxmlformats.org/officeDocument/2006/relationships" xmlns:p="http://schemas.openxmlformats.org/presentationml/2006/main">
   <p:cSld>
@@ -8187,10 +8536,69 @@
       </p:grpSpPr>
       <p:sp>
         <p:nvSpPr>
-          <p:cNvPr id="3" name="&quot;Not Allowed&quot; Symbol 2">
-            <a:extLst>
-              <a:ext uri="{FF2B5EF4-FFF2-40B4-BE49-F238E27FC236}">
-                <a16:creationId xmlns:a16="http://schemas.microsoft.com/office/drawing/2014/main" id="{6D0EF780-65B1-4670-A2F7-060CDA577D92}"/>
+          <p:cNvPr id="2" name="Title 1">
+            <a:extLst>
+              <a:ext uri="{FF2B5EF4-FFF2-40B4-BE49-F238E27FC236}">
+                <a16:creationId xmlns:a16="http://schemas.microsoft.com/office/drawing/2014/main" id="{A93D67CF-F60A-43DE-B742-EC019B03B8B4}"/>
+              </a:ext>
+            </a:extLst>
+          </p:cNvPr>
+          <p:cNvSpPr>
+            <a:spLocks noGrp="1"/>
+          </p:cNvSpPr>
+          <p:nvPr>
+            <p:ph type="title"/>
+          </p:nvPr>
+        </p:nvSpPr>
+        <p:spPr/>
+        <p:txBody>
+          <a:bodyPr/>
+          <a:lstStyle/>
+          <a:p>
+            <a:r>
+              <a:rPr lang="en-IE" dirty="0"/>
+              <a:t>Solution 3 (b): Re-run </a:t>
+            </a:r>
+            <a:endParaRPr lang="en-GB" dirty="0"/>
+          </a:p>
+        </p:txBody>
+      </p:sp>
+      <p:pic>
+        <p:nvPicPr>
+          <p:cNvPr id="4" name="Picture 3">
+            <a:extLst>
+              <a:ext uri="{FF2B5EF4-FFF2-40B4-BE49-F238E27FC236}">
+                <a16:creationId xmlns:a16="http://schemas.microsoft.com/office/drawing/2014/main" id="{48D4F640-EC03-49A9-9C2A-BDEBC43AABA6}"/>
+              </a:ext>
+            </a:extLst>
+          </p:cNvPr>
+          <p:cNvPicPr>
+            <a:picLocks noChangeAspect="1"/>
+          </p:cNvPicPr>
+          <p:nvPr/>
+        </p:nvPicPr>
+        <p:blipFill>
+          <a:blip r:embed="rId3"/>
+          <a:stretch>
+            <a:fillRect/>
+          </a:stretch>
+        </p:blipFill>
+        <p:spPr>
+          <a:xfrm>
+            <a:off x="10039048" y="161457"/>
+            <a:ext cx="1978023" cy="1732898"/>
+          </a:xfrm>
+          <a:prstGeom prst="rect">
+            <a:avLst/>
+          </a:prstGeom>
+        </p:spPr>
+      </p:pic>
+      <p:sp>
+        <p:nvSpPr>
+          <p:cNvPr id="5" name="Flowchart: Process 4">
+            <a:extLst>
+              <a:ext uri="{FF2B5EF4-FFF2-40B4-BE49-F238E27FC236}">
+                <a16:creationId xmlns:a16="http://schemas.microsoft.com/office/drawing/2014/main" id="{734B19F1-9B96-4597-AF69-744449068724}"/>
               </a:ext>
             </a:extLst>
           </p:cNvPr>
@@ -8199,25 +8607,12 @@
         </p:nvSpPr>
         <p:spPr>
           <a:xfrm>
-            <a:off x="4897396" y="3796110"/>
-            <a:ext cx="575034" cy="575034"/>
-          </a:xfrm>
-          <a:prstGeom prst="noSmoking">
-            <a:avLst/>
-          </a:prstGeom>
-          <a:solidFill>
-            <a:schemeClr val="accent2">
-              <a:lumMod val="60000"/>
-              <a:lumOff val="40000"/>
-            </a:schemeClr>
-          </a:solidFill>
-          <a:ln>
-            <a:solidFill>
-              <a:schemeClr val="accent2">
-                <a:lumMod val="75000"/>
-              </a:schemeClr>
-            </a:solidFill>
-          </a:ln>
+            <a:off x="1582310" y="3236181"/>
+            <a:ext cx="2560320" cy="1325563"/>
+          </a:xfrm>
+          <a:prstGeom prst="flowChartProcess">
+            <a:avLst/>
+          </a:prstGeom>
         </p:spPr>
         <p:style>
           <a:lnRef idx="2">
@@ -8240,87 +8635,20 @@
           <a:lstStyle/>
           <a:p>
             <a:pPr algn="ctr"/>
-            <a:endParaRPr lang="en-GB">
-              <a:solidFill>
-                <a:schemeClr val="tx1"/>
-              </a:solidFill>
-            </a:endParaRPr>
-          </a:p>
-        </p:txBody>
-      </p:sp>
-      <p:sp>
-        <p:nvSpPr>
-          <p:cNvPr id="2" name="Title 1">
-            <a:extLst>
-              <a:ext uri="{FF2B5EF4-FFF2-40B4-BE49-F238E27FC236}">
-                <a16:creationId xmlns:a16="http://schemas.microsoft.com/office/drawing/2014/main" id="{A93D67CF-F60A-43DE-B742-EC019B03B8B4}"/>
-              </a:ext>
-            </a:extLst>
-          </p:cNvPr>
-          <p:cNvSpPr>
-            <a:spLocks noGrp="1"/>
-          </p:cNvSpPr>
-          <p:nvPr>
-            <p:ph type="title"/>
-          </p:nvPr>
-        </p:nvSpPr>
-        <p:spPr/>
-        <p:txBody>
-          <a:bodyPr/>
-          <a:lstStyle/>
-          <a:p>
             <a:r>
               <a:rPr lang="en-IE" dirty="0"/>
-              <a:t>Solution 4: Look </a:t>
-            </a:r>
-            <a:r>
-              <a:rPr lang="en-IE" b="1" dirty="0"/>
-              <a:t>behind</a:t>
-            </a:r>
-            <a:r>
-              <a:rPr lang="en-IE" dirty="0"/>
-              <a:t> you…</a:t>
+              <a:t>Get state</a:t>
             </a:r>
             <a:endParaRPr lang="en-GB" dirty="0"/>
           </a:p>
         </p:txBody>
       </p:sp>
-      <p:pic>
-        <p:nvPicPr>
-          <p:cNvPr id="4" name="Picture 3">
-            <a:extLst>
-              <a:ext uri="{FF2B5EF4-FFF2-40B4-BE49-F238E27FC236}">
-                <a16:creationId xmlns:a16="http://schemas.microsoft.com/office/drawing/2014/main" id="{48D4F640-EC03-49A9-9C2A-BDEBC43AABA6}"/>
-              </a:ext>
-            </a:extLst>
-          </p:cNvPr>
-          <p:cNvPicPr>
-            <a:picLocks noChangeAspect="1"/>
-          </p:cNvPicPr>
-          <p:nvPr/>
-        </p:nvPicPr>
-        <p:blipFill>
-          <a:blip r:embed="rId3"/>
-          <a:stretch>
-            <a:fillRect/>
-          </a:stretch>
-        </p:blipFill>
-        <p:spPr>
-          <a:xfrm>
-            <a:off x="10039048" y="161457"/>
-            <a:ext cx="1978023" cy="1732898"/>
-          </a:xfrm>
-          <a:prstGeom prst="rect">
-            <a:avLst/>
-          </a:prstGeom>
-        </p:spPr>
-      </p:pic>
-      <p:sp>
-        <p:nvSpPr>
-          <p:cNvPr id="5" name="Flowchart: Process 4">
-            <a:extLst>
-              <a:ext uri="{FF2B5EF4-FFF2-40B4-BE49-F238E27FC236}">
-                <a16:creationId xmlns:a16="http://schemas.microsoft.com/office/drawing/2014/main" id="{FE497085-156A-4B13-8479-51BAEA4E41D0}"/>
+      <p:sp>
+        <p:nvSpPr>
+          <p:cNvPr id="6" name="Flowchart: Process 5">
+            <a:extLst>
+              <a:ext uri="{FF2B5EF4-FFF2-40B4-BE49-F238E27FC236}">
+                <a16:creationId xmlns:a16="http://schemas.microsoft.com/office/drawing/2014/main" id="{0EE3C583-B559-47BB-9EB9-7C3B35DE0C31}"/>
               </a:ext>
             </a:extLst>
           </p:cNvPr>
@@ -8329,7 +8657,7 @@
         </p:nvSpPr>
         <p:spPr>
           <a:xfrm>
-            <a:off x="1582310" y="3236181"/>
+            <a:off x="6227197" y="3236180"/>
             <a:ext cx="2560320" cy="1325563"/>
           </a:xfrm>
           <a:prstGeom prst="flowChartProcess">
@@ -8359,18 +8687,96 @@
             <a:pPr algn="ctr"/>
             <a:r>
               <a:rPr lang="en-IE" dirty="0"/>
-              <a:t>Get state</a:t>
+              <a:t>Act on state</a:t>
             </a:r>
             <a:endParaRPr lang="en-GB" dirty="0"/>
           </a:p>
         </p:txBody>
       </p:sp>
-      <p:sp>
-        <p:nvSpPr>
-          <p:cNvPr id="6" name="Flowchart: Process 5">
-            <a:extLst>
-              <a:ext uri="{FF2B5EF4-FFF2-40B4-BE49-F238E27FC236}">
-                <a16:creationId xmlns:a16="http://schemas.microsoft.com/office/drawing/2014/main" id="{FC052706-ED76-4C1E-9066-1812DA8BFA71}"/>
+      <p:cxnSp>
+        <p:nvCxnSpPr>
+          <p:cNvPr id="7" name="Straight Arrow Connector 6">
+            <a:extLst>
+              <a:ext uri="{FF2B5EF4-FFF2-40B4-BE49-F238E27FC236}">
+                <a16:creationId xmlns:a16="http://schemas.microsoft.com/office/drawing/2014/main" id="{3A76B0E8-1D0F-4DF9-A92D-BB3FA24F8FF6}"/>
+              </a:ext>
+            </a:extLst>
+          </p:cNvPr>
+          <p:cNvCxnSpPr>
+            <a:stCxn id="5" idx="3"/>
+            <a:endCxn id="6" idx="1"/>
+          </p:cNvCxnSpPr>
+          <p:nvPr/>
+        </p:nvCxnSpPr>
+        <p:spPr>
+          <a:xfrm flipV="1">
+            <a:off x="4142630" y="3898962"/>
+            <a:ext cx="2084567" cy="1"/>
+          </a:xfrm>
+          <a:prstGeom prst="straightConnector1">
+            <a:avLst/>
+          </a:prstGeom>
+          <a:ln>
+            <a:tailEnd type="triangle"/>
+          </a:ln>
+        </p:spPr>
+        <p:style>
+          <a:lnRef idx="3">
+            <a:schemeClr val="accent5"/>
+          </a:lnRef>
+          <a:fillRef idx="0">
+            <a:schemeClr val="accent5"/>
+          </a:fillRef>
+          <a:effectRef idx="2">
+            <a:schemeClr val="accent5"/>
+          </a:effectRef>
+          <a:fontRef idx="minor">
+            <a:schemeClr val="tx1"/>
+          </a:fontRef>
+        </p:style>
+      </p:cxnSp>
+      <p:sp>
+        <p:nvSpPr>
+          <p:cNvPr id="8" name="TextBox 7">
+            <a:extLst>
+              <a:ext uri="{FF2B5EF4-FFF2-40B4-BE49-F238E27FC236}">
+                <a16:creationId xmlns:a16="http://schemas.microsoft.com/office/drawing/2014/main" id="{63A4C98A-E5EE-4550-8643-A870CE5C320D}"/>
+              </a:ext>
+            </a:extLst>
+          </p:cNvPr>
+          <p:cNvSpPr txBox="1"/>
+          <p:nvPr/>
+        </p:nvSpPr>
+        <p:spPr>
+          <a:xfrm>
+            <a:off x="5054108" y="3898961"/>
+            <a:ext cx="261610" cy="369332"/>
+          </a:xfrm>
+          <a:prstGeom prst="rect">
+            <a:avLst/>
+          </a:prstGeom>
+          <a:noFill/>
+        </p:spPr>
+        <p:txBody>
+          <a:bodyPr wrap="none" rtlCol="0">
+            <a:spAutoFit/>
+          </a:bodyPr>
+          <a:lstStyle/>
+          <a:p>
+            <a:r>
+              <a:rPr lang="en-IE" i="1" dirty="0"/>
+              <a:t>t</a:t>
+            </a:r>
+            <a:endParaRPr lang="en-GB" i="1" dirty="0"/>
+          </a:p>
+        </p:txBody>
+      </p:sp>
+      <p:sp>
+        <p:nvSpPr>
+          <p:cNvPr id="9" name="Isosceles Triangle 8">
+            <a:extLst>
+              <a:ext uri="{FF2B5EF4-FFF2-40B4-BE49-F238E27FC236}">
+                <a16:creationId xmlns:a16="http://schemas.microsoft.com/office/drawing/2014/main" id="{312390E5-8341-4236-B8F6-54D524B365F5}"/>
               </a:ext>
             </a:extLst>
           </p:cNvPr>
@@ -8378,11 +8784,11 @@
           <p:nvPr/>
         </p:nvSpPr>
         <p:spPr>
-          <a:xfrm>
-            <a:off x="6227197" y="3236180"/>
-            <a:ext cx="2560320" cy="1325563"/>
-          </a:xfrm>
-          <a:prstGeom prst="flowChartProcess">
+          <a:xfrm rot="20130936">
+            <a:off x="4914676" y="4007012"/>
+            <a:ext cx="119233" cy="123345"/>
+          </a:xfrm>
+          <a:prstGeom prst="triangle">
             <a:avLst/>
           </a:prstGeom>
         </p:spPr>
@@ -8407,9 +8813,234 @@
           <a:lstStyle/>
           <a:p>
             <a:pPr algn="ctr"/>
+            <a:endParaRPr lang="en-GB"/>
+          </a:p>
+        </p:txBody>
+      </p:sp>
+      <p:sp>
+        <p:nvSpPr>
+          <p:cNvPr id="10" name="Isosceles Triangle 9">
+            <a:extLst>
+              <a:ext uri="{FF2B5EF4-FFF2-40B4-BE49-F238E27FC236}">
+                <a16:creationId xmlns:a16="http://schemas.microsoft.com/office/drawing/2014/main" id="{E31237F4-6F9F-4BAA-8D2A-332A50ACD718}"/>
+              </a:ext>
+            </a:extLst>
+          </p:cNvPr>
+          <p:cNvSpPr/>
+          <p:nvPr/>
+        </p:nvSpPr>
+        <p:spPr>
+          <a:xfrm rot="20130936">
+            <a:off x="4731552" y="4007011"/>
+            <a:ext cx="119233" cy="123345"/>
+          </a:xfrm>
+          <a:prstGeom prst="triangle">
+            <a:avLst/>
+          </a:prstGeom>
+          <a:solidFill>
+            <a:schemeClr val="accent5">
+              <a:lumMod val="60000"/>
+              <a:lumOff val="40000"/>
+            </a:schemeClr>
+          </a:solidFill>
+          <a:ln>
+            <a:solidFill>
+              <a:schemeClr val="accent5">
+                <a:lumMod val="60000"/>
+                <a:lumOff val="40000"/>
+              </a:schemeClr>
+            </a:solidFill>
+          </a:ln>
+        </p:spPr>
+        <p:style>
+          <a:lnRef idx="2">
+            <a:schemeClr val="accent1">
+              <a:shade val="50000"/>
+            </a:schemeClr>
+          </a:lnRef>
+          <a:fillRef idx="1">
+            <a:schemeClr val="accent1"/>
+          </a:fillRef>
+          <a:effectRef idx="0">
+            <a:schemeClr val="accent1"/>
+          </a:effectRef>
+          <a:fontRef idx="minor">
+            <a:schemeClr val="lt1"/>
+          </a:fontRef>
+        </p:style>
+        <p:txBody>
+          <a:bodyPr rtlCol="0" anchor="ctr"/>
+          <a:lstStyle/>
+          <a:p>
+            <a:pPr algn="ctr"/>
+            <a:endParaRPr lang="en-GB"/>
+          </a:p>
+        </p:txBody>
+      </p:sp>
+      <p:sp>
+        <p:nvSpPr>
+          <p:cNvPr id="11" name="Isosceles Triangle 10">
+            <a:extLst>
+              <a:ext uri="{FF2B5EF4-FFF2-40B4-BE49-F238E27FC236}">
+                <a16:creationId xmlns:a16="http://schemas.microsoft.com/office/drawing/2014/main" id="{B582E31E-BCB2-472F-8667-07F7842F1862}"/>
+              </a:ext>
+            </a:extLst>
+          </p:cNvPr>
+          <p:cNvSpPr/>
+          <p:nvPr/>
+        </p:nvSpPr>
+        <p:spPr>
+          <a:xfrm rot="20130936">
+            <a:off x="5290601" y="4007011"/>
+            <a:ext cx="119233" cy="123345"/>
+          </a:xfrm>
+          <a:prstGeom prst="triangle">
+            <a:avLst/>
+          </a:prstGeom>
+        </p:spPr>
+        <p:style>
+          <a:lnRef idx="2">
+            <a:schemeClr val="accent1">
+              <a:shade val="50000"/>
+            </a:schemeClr>
+          </a:lnRef>
+          <a:fillRef idx="1">
+            <a:schemeClr val="accent1"/>
+          </a:fillRef>
+          <a:effectRef idx="0">
+            <a:schemeClr val="accent1"/>
+          </a:effectRef>
+          <a:fontRef idx="minor">
+            <a:schemeClr val="lt1"/>
+          </a:fontRef>
+        </p:style>
+        <p:txBody>
+          <a:bodyPr rtlCol="0" anchor="ctr"/>
+          <a:lstStyle/>
+          <a:p>
+            <a:pPr algn="ctr"/>
+            <a:endParaRPr lang="en-GB"/>
+          </a:p>
+        </p:txBody>
+      </p:sp>
+      <p:sp>
+        <p:nvSpPr>
+          <p:cNvPr id="12" name="Isosceles Triangle 11">
+            <a:extLst>
+              <a:ext uri="{FF2B5EF4-FFF2-40B4-BE49-F238E27FC236}">
+                <a16:creationId xmlns:a16="http://schemas.microsoft.com/office/drawing/2014/main" id="{83731014-4714-4CBE-8263-C4A72401AB0F}"/>
+              </a:ext>
+            </a:extLst>
+          </p:cNvPr>
+          <p:cNvSpPr/>
+          <p:nvPr/>
+        </p:nvSpPr>
+        <p:spPr>
+          <a:xfrm rot="20130936">
+            <a:off x="5477727" y="4007010"/>
+            <a:ext cx="119233" cy="123345"/>
+          </a:xfrm>
+          <a:prstGeom prst="triangle">
+            <a:avLst/>
+          </a:prstGeom>
+          <a:solidFill>
+            <a:schemeClr val="accent5">
+              <a:lumMod val="60000"/>
+              <a:lumOff val="40000"/>
+            </a:schemeClr>
+          </a:solidFill>
+          <a:ln>
+            <a:solidFill>
+              <a:schemeClr val="accent5">
+                <a:lumMod val="60000"/>
+                <a:lumOff val="40000"/>
+              </a:schemeClr>
+            </a:solidFill>
+          </a:ln>
+        </p:spPr>
+        <p:style>
+          <a:lnRef idx="2">
+            <a:schemeClr val="accent1">
+              <a:shade val="50000"/>
+            </a:schemeClr>
+          </a:lnRef>
+          <a:fillRef idx="1">
+            <a:schemeClr val="accent1"/>
+          </a:fillRef>
+          <a:effectRef idx="0">
+            <a:schemeClr val="accent1"/>
+          </a:effectRef>
+          <a:fontRef idx="minor">
+            <a:schemeClr val="lt1"/>
+          </a:fontRef>
+        </p:style>
+        <p:txBody>
+          <a:bodyPr rtlCol="0" anchor="ctr"/>
+          <a:lstStyle/>
+          <a:p>
+            <a:pPr algn="ctr"/>
+            <a:endParaRPr lang="en-GB"/>
+          </a:p>
+        </p:txBody>
+      </p:sp>
+      <p:sp>
+        <p:nvSpPr>
+          <p:cNvPr id="3" name="Oval 2">
+            <a:extLst>
+              <a:ext uri="{FF2B5EF4-FFF2-40B4-BE49-F238E27FC236}">
+                <a16:creationId xmlns:a16="http://schemas.microsoft.com/office/drawing/2014/main" id="{1A40AD1B-1297-4382-8BCE-80F5CFEDF25D}"/>
+              </a:ext>
+            </a:extLst>
+          </p:cNvPr>
+          <p:cNvSpPr/>
+          <p:nvPr/>
+        </p:nvSpPr>
+        <p:spPr>
+          <a:xfrm>
+            <a:off x="9584681" y="3624722"/>
+            <a:ext cx="548478" cy="548478"/>
+          </a:xfrm>
+          <a:prstGeom prst="ellipse">
+            <a:avLst/>
+          </a:prstGeom>
+          <a:solidFill>
+            <a:schemeClr val="accent2">
+              <a:lumMod val="60000"/>
+              <a:lumOff val="40000"/>
+            </a:schemeClr>
+          </a:solidFill>
+          <a:ln w="28575">
+            <a:solidFill>
+              <a:schemeClr val="accent5">
+                <a:lumMod val="50000"/>
+              </a:schemeClr>
+            </a:solidFill>
+          </a:ln>
+        </p:spPr>
+        <p:style>
+          <a:lnRef idx="2">
+            <a:schemeClr val="accent1">
+              <a:shade val="50000"/>
+            </a:schemeClr>
+          </a:lnRef>
+          <a:fillRef idx="1">
+            <a:schemeClr val="accent1"/>
+          </a:fillRef>
+          <a:effectRef idx="0">
+            <a:schemeClr val="accent1"/>
+          </a:effectRef>
+          <a:fontRef idx="minor">
+            <a:schemeClr val="lt1"/>
+          </a:fontRef>
+        </p:style>
+        <p:txBody>
+          <a:bodyPr rtlCol="0" anchor="ctr"/>
+          <a:lstStyle/>
+          <a:p>
+            <a:pPr algn="ctr"/>
             <a:r>
               <a:rPr lang="en-IE" dirty="0"/>
-              <a:t>Act on prior state</a:t>
+              <a:t>?</a:t>
             </a:r>
             <a:endParaRPr lang="en-GB" dirty="0"/>
           </a:p>
@@ -8417,23 +9048,24 @@
       </p:sp>
       <p:cxnSp>
         <p:nvCxnSpPr>
-          <p:cNvPr id="7" name="Straight Arrow Connector 6">
-            <a:extLst>
-              <a:ext uri="{FF2B5EF4-FFF2-40B4-BE49-F238E27FC236}">
-                <a16:creationId xmlns:a16="http://schemas.microsoft.com/office/drawing/2014/main" id="{C8DAA702-D810-4E7E-ADC3-E6750E5EDB37}"/>
+          <p:cNvPr id="14" name="Straight Arrow Connector 13">
+            <a:extLst>
+              <a:ext uri="{FF2B5EF4-FFF2-40B4-BE49-F238E27FC236}">
+                <a16:creationId xmlns:a16="http://schemas.microsoft.com/office/drawing/2014/main" id="{4729A755-A7D1-49EE-9F99-4DDF34DD1A68}"/>
               </a:ext>
             </a:extLst>
           </p:cNvPr>
           <p:cNvCxnSpPr>
-            <a:stCxn id="5" idx="3"/>
-            <a:endCxn id="6" idx="1"/>
+            <a:cxnSpLocks/>
+            <a:stCxn id="6" idx="3"/>
+            <a:endCxn id="3" idx="2"/>
           </p:cNvCxnSpPr>
           <p:nvPr/>
         </p:nvCxnSpPr>
         <p:spPr>
           <a:xfrm flipV="1">
-            <a:off x="4142630" y="3898962"/>
-            <a:ext cx="2084567" cy="1"/>
+            <a:off x="8787517" y="3898961"/>
+            <a:ext cx="797164" cy="1"/>
           </a:xfrm>
           <a:prstGeom prst="straightConnector1">
             <a:avLst/>
@@ -8459,6 +9091,939 @@
       </p:cxnSp>
       <p:sp>
         <p:nvSpPr>
+          <p:cNvPr id="19" name="Rectangle: Diagonal Corners Rounded 18">
+            <a:extLst>
+              <a:ext uri="{FF2B5EF4-FFF2-40B4-BE49-F238E27FC236}">
+                <a16:creationId xmlns:a16="http://schemas.microsoft.com/office/drawing/2014/main" id="{67F2252E-5B57-4A14-B4EB-DF1FC1321436}"/>
+              </a:ext>
+            </a:extLst>
+          </p:cNvPr>
+          <p:cNvSpPr/>
+          <p:nvPr/>
+        </p:nvSpPr>
+        <p:spPr>
+          <a:xfrm>
+            <a:off x="6758811" y="4897508"/>
+            <a:ext cx="1206631" cy="548479"/>
+          </a:xfrm>
+          <a:prstGeom prst="round2DiagRect">
+            <a:avLst/>
+          </a:prstGeom>
+          <a:solidFill>
+            <a:schemeClr val="accent2">
+              <a:lumMod val="60000"/>
+              <a:lumOff val="40000"/>
+            </a:schemeClr>
+          </a:solidFill>
+          <a:ln>
+            <a:solidFill>
+              <a:schemeClr val="accent2">
+                <a:lumMod val="75000"/>
+              </a:schemeClr>
+            </a:solidFill>
+          </a:ln>
+        </p:spPr>
+        <p:style>
+          <a:lnRef idx="2">
+            <a:schemeClr val="accent1">
+              <a:shade val="50000"/>
+            </a:schemeClr>
+          </a:lnRef>
+          <a:fillRef idx="1">
+            <a:schemeClr val="accent1"/>
+          </a:fillRef>
+          <a:effectRef idx="0">
+            <a:schemeClr val="accent1"/>
+          </a:effectRef>
+          <a:fontRef idx="minor">
+            <a:schemeClr val="lt1"/>
+          </a:fontRef>
+        </p:style>
+        <p:txBody>
+          <a:bodyPr rtlCol="0" anchor="ctr"/>
+          <a:lstStyle/>
+          <a:p>
+            <a:pPr algn="ctr"/>
+            <a:r>
+              <a:rPr lang="en-IE" dirty="0"/>
+              <a:t>RETRY</a:t>
+            </a:r>
+            <a:endParaRPr lang="en-GB" dirty="0"/>
+          </a:p>
+        </p:txBody>
+      </p:sp>
+      <p:cxnSp>
+        <p:nvCxnSpPr>
+          <p:cNvPr id="21" name="Connector: Elbow 20">
+            <a:extLst>
+              <a:ext uri="{FF2B5EF4-FFF2-40B4-BE49-F238E27FC236}">
+                <a16:creationId xmlns:a16="http://schemas.microsoft.com/office/drawing/2014/main" id="{BBF167B4-AD51-4564-AC78-41B346AB9B84}"/>
+              </a:ext>
+            </a:extLst>
+          </p:cNvPr>
+          <p:cNvCxnSpPr>
+            <a:stCxn id="3" idx="6"/>
+            <a:endCxn id="19" idx="0"/>
+          </p:cNvCxnSpPr>
+          <p:nvPr/>
+        </p:nvCxnSpPr>
+        <p:spPr>
+          <a:xfrm flipH="1">
+            <a:off x="7965442" y="3898961"/>
+            <a:ext cx="2167717" cy="1272787"/>
+          </a:xfrm>
+          <a:prstGeom prst="bentConnector3">
+            <a:avLst>
+              <a:gd name="adj1" fmla="val -10546"/>
+            </a:avLst>
+          </a:prstGeom>
+          <a:ln>
+            <a:tailEnd type="triangle"/>
+          </a:ln>
+        </p:spPr>
+        <p:style>
+          <a:lnRef idx="1">
+            <a:schemeClr val="accent1"/>
+          </a:lnRef>
+          <a:fillRef idx="0">
+            <a:schemeClr val="accent1"/>
+          </a:fillRef>
+          <a:effectRef idx="0">
+            <a:schemeClr val="accent1"/>
+          </a:effectRef>
+          <a:fontRef idx="minor">
+            <a:schemeClr val="tx1"/>
+          </a:fontRef>
+        </p:style>
+      </p:cxnSp>
+      <p:cxnSp>
+        <p:nvCxnSpPr>
+          <p:cNvPr id="23" name="Connector: Elbow 22">
+            <a:extLst>
+              <a:ext uri="{FF2B5EF4-FFF2-40B4-BE49-F238E27FC236}">
+                <a16:creationId xmlns:a16="http://schemas.microsoft.com/office/drawing/2014/main" id="{01DF97BB-86C8-4728-9866-03FF7A98360B}"/>
+              </a:ext>
+            </a:extLst>
+          </p:cNvPr>
+          <p:cNvCxnSpPr>
+            <a:cxnSpLocks/>
+            <a:stCxn id="19" idx="2"/>
+            <a:endCxn id="5" idx="1"/>
+          </p:cNvCxnSpPr>
+          <p:nvPr/>
+        </p:nvCxnSpPr>
+        <p:spPr>
+          <a:xfrm rot="10800000">
+            <a:off x="1582311" y="3898964"/>
+            <a:ext cx="5176501" cy="1272785"/>
+          </a:xfrm>
+          <a:prstGeom prst="bentConnector3">
+            <a:avLst>
+              <a:gd name="adj1" fmla="val 104416"/>
+            </a:avLst>
+          </a:prstGeom>
+          <a:ln>
+            <a:tailEnd type="triangle"/>
+          </a:ln>
+        </p:spPr>
+        <p:style>
+          <a:lnRef idx="1">
+            <a:schemeClr val="accent1"/>
+          </a:lnRef>
+          <a:fillRef idx="0">
+            <a:schemeClr val="accent1"/>
+          </a:fillRef>
+          <a:effectRef idx="0">
+            <a:schemeClr val="accent1"/>
+          </a:effectRef>
+          <a:fontRef idx="minor">
+            <a:schemeClr val="tx1"/>
+          </a:fontRef>
+        </p:style>
+      </p:cxnSp>
+      <p:pic>
+        <p:nvPicPr>
+          <p:cNvPr id="17" name="Graphic 16" descr="Close with solid fill">
+            <a:extLst>
+              <a:ext uri="{FF2B5EF4-FFF2-40B4-BE49-F238E27FC236}">
+                <a16:creationId xmlns:a16="http://schemas.microsoft.com/office/drawing/2014/main" id="{8B26AB57-8A1E-4722-B159-49CE1A8E2A47}"/>
+              </a:ext>
+            </a:extLst>
+          </p:cNvPr>
+          <p:cNvPicPr>
+            <a:picLocks noChangeAspect="1"/>
+          </p:cNvPicPr>
+          <p:nvPr/>
+        </p:nvPicPr>
+        <p:blipFill>
+          <a:blip r:embed="rId4">
+            <a:extLst>
+              <a:ext uri="{28A0092B-C50C-407E-A947-70E740481C1C}">
+                <a14:useLocalDpi xmlns:a14="http://schemas.microsoft.com/office/drawing/2010/main" val="0"/>
+              </a:ext>
+              <a:ext uri="{96DAC541-7B7A-43D3-8B79-37D633B846F1}">
+                <asvg:svgBlip xmlns:asvg="http://schemas.microsoft.com/office/drawing/2016/SVG/main" r:embed="rId5"/>
+              </a:ext>
+            </a:extLst>
+          </a:blip>
+          <a:stretch>
+            <a:fillRect/>
+          </a:stretch>
+        </p:blipFill>
+        <p:spPr>
+          <a:xfrm>
+            <a:off x="6227197" y="5509218"/>
+            <a:ext cx="914400" cy="914400"/>
+          </a:xfrm>
+          <a:prstGeom prst="rect">
+            <a:avLst/>
+          </a:prstGeom>
+        </p:spPr>
+      </p:pic>
+      <p:pic>
+        <p:nvPicPr>
+          <p:cNvPr id="18" name="Graphic 17" descr="Checkmark with solid fill">
+            <a:extLst>
+              <a:ext uri="{FF2B5EF4-FFF2-40B4-BE49-F238E27FC236}">
+                <a16:creationId xmlns:a16="http://schemas.microsoft.com/office/drawing/2014/main" id="{24FE831D-FD46-4589-98A3-3AC05A0C914D}"/>
+              </a:ext>
+            </a:extLst>
+          </p:cNvPr>
+          <p:cNvPicPr>
+            <a:picLocks noChangeAspect="1"/>
+          </p:cNvPicPr>
+          <p:nvPr/>
+        </p:nvPicPr>
+        <p:blipFill>
+          <a:blip r:embed="rId6">
+            <a:extLst>
+              <a:ext uri="{28A0092B-C50C-407E-A947-70E740481C1C}">
+                <a14:useLocalDpi xmlns:a14="http://schemas.microsoft.com/office/drawing/2010/main" val="0"/>
+              </a:ext>
+              <a:ext uri="{96DAC541-7B7A-43D3-8B79-37D633B846F1}">
+                <asvg:svgBlip xmlns:asvg="http://schemas.microsoft.com/office/drawing/2016/SVG/main" r:embed="rId7"/>
+              </a:ext>
+            </a:extLst>
+          </a:blip>
+          <a:stretch>
+            <a:fillRect/>
+          </a:stretch>
+        </p:blipFill>
+        <p:spPr>
+          <a:xfrm>
+            <a:off x="838200" y="5509218"/>
+            <a:ext cx="914400" cy="914400"/>
+          </a:xfrm>
+          <a:prstGeom prst="rect">
+            <a:avLst/>
+          </a:prstGeom>
+        </p:spPr>
+      </p:pic>
+      <p:sp>
+        <p:nvSpPr>
+          <p:cNvPr id="20" name="TextBox 19">
+            <a:extLst>
+              <a:ext uri="{FF2B5EF4-FFF2-40B4-BE49-F238E27FC236}">
+                <a16:creationId xmlns:a16="http://schemas.microsoft.com/office/drawing/2014/main" id="{A5B1E414-3257-4BDF-8AAB-EB7CFB13E81A}"/>
+              </a:ext>
+            </a:extLst>
+          </p:cNvPr>
+          <p:cNvSpPr txBox="1"/>
+          <p:nvPr/>
+        </p:nvSpPr>
+        <p:spPr>
+          <a:xfrm>
+            <a:off x="1929746" y="5781752"/>
+            <a:ext cx="3940309" cy="369332"/>
+          </a:xfrm>
+          <a:prstGeom prst="rect">
+            <a:avLst/>
+          </a:prstGeom>
+          <a:noFill/>
+        </p:spPr>
+        <p:txBody>
+          <a:bodyPr wrap="none" rtlCol="0">
+            <a:spAutoFit/>
+          </a:bodyPr>
+          <a:lstStyle/>
+          <a:p>
+            <a:r>
+              <a:rPr lang="en-IE" dirty="0"/>
+              <a:t>Very efficient if contention rates are low</a:t>
+            </a:r>
+            <a:endParaRPr lang="en-GB" dirty="0"/>
+          </a:p>
+        </p:txBody>
+      </p:sp>
+      <p:sp>
+        <p:nvSpPr>
+          <p:cNvPr id="22" name="TextBox 21">
+            <a:extLst>
+              <a:ext uri="{FF2B5EF4-FFF2-40B4-BE49-F238E27FC236}">
+                <a16:creationId xmlns:a16="http://schemas.microsoft.com/office/drawing/2014/main" id="{7BA8AD15-5A5E-4BE6-A4BC-FDFB5E43A3F3}"/>
+              </a:ext>
+            </a:extLst>
+          </p:cNvPr>
+          <p:cNvSpPr txBox="1"/>
+          <p:nvPr/>
+        </p:nvSpPr>
+        <p:spPr>
+          <a:xfrm>
+            <a:off x="7362127" y="5781752"/>
+            <a:ext cx="2235035" cy="369332"/>
+          </a:xfrm>
+          <a:prstGeom prst="rect">
+            <a:avLst/>
+          </a:prstGeom>
+          <a:noFill/>
+        </p:spPr>
+        <p:txBody>
+          <a:bodyPr wrap="none" rtlCol="0">
+            <a:spAutoFit/>
+          </a:bodyPr>
+          <a:lstStyle/>
+          <a:p>
+            <a:r>
+              <a:rPr lang="en-IE" dirty="0"/>
+              <a:t>Risk of getting “stuck”</a:t>
+            </a:r>
+            <a:endParaRPr lang="en-GB" dirty="0"/>
+          </a:p>
+        </p:txBody>
+      </p:sp>
+      <p:sp>
+        <p:nvSpPr>
+          <p:cNvPr id="13" name="Thought Bubble: Cloud 12">
+            <a:extLst>
+              <a:ext uri="{FF2B5EF4-FFF2-40B4-BE49-F238E27FC236}">
+                <a16:creationId xmlns:a16="http://schemas.microsoft.com/office/drawing/2014/main" id="{61453F97-9441-430D-8740-83F5E2F3F27B}"/>
+              </a:ext>
+            </a:extLst>
+          </p:cNvPr>
+          <p:cNvSpPr/>
+          <p:nvPr/>
+        </p:nvSpPr>
+        <p:spPr>
+          <a:xfrm>
+            <a:off x="9154250" y="1973674"/>
+            <a:ext cx="2672862" cy="1590364"/>
+          </a:xfrm>
+          <a:prstGeom prst="cloudCallout">
+            <a:avLst/>
+          </a:prstGeom>
+        </p:spPr>
+        <p:style>
+          <a:lnRef idx="0">
+            <a:schemeClr val="accent6"/>
+          </a:lnRef>
+          <a:fillRef idx="3">
+            <a:schemeClr val="accent6"/>
+          </a:fillRef>
+          <a:effectRef idx="3">
+            <a:schemeClr val="accent6"/>
+          </a:effectRef>
+          <a:fontRef idx="minor">
+            <a:schemeClr val="lt1"/>
+          </a:fontRef>
+        </p:style>
+        <p:txBody>
+          <a:bodyPr rtlCol="0" anchor="ctr"/>
+          <a:lstStyle/>
+          <a:p>
+            <a:pPr algn="ctr"/>
+            <a:r>
+              <a:rPr lang="en-IE" dirty="0"/>
+              <a:t>How do I know if there has been any change?</a:t>
+            </a:r>
+            <a:endParaRPr lang="en-GB" dirty="0"/>
+          </a:p>
+        </p:txBody>
+      </p:sp>
+      <p:sp>
+        <p:nvSpPr>
+          <p:cNvPr id="15" name="Callout: Down Arrow 14">
+            <a:extLst>
+              <a:ext uri="{FF2B5EF4-FFF2-40B4-BE49-F238E27FC236}">
+                <a16:creationId xmlns:a16="http://schemas.microsoft.com/office/drawing/2014/main" id="{DCB382FA-DB69-406B-AF87-8B77A78F29FF}"/>
+              </a:ext>
+            </a:extLst>
+          </p:cNvPr>
+          <p:cNvSpPr/>
+          <p:nvPr/>
+        </p:nvSpPr>
+        <p:spPr>
+          <a:xfrm>
+            <a:off x="3010228" y="2211604"/>
+            <a:ext cx="1646893" cy="1166441"/>
+          </a:xfrm>
+          <a:prstGeom prst="downArrowCallout">
+            <a:avLst/>
+          </a:prstGeom>
+        </p:spPr>
+        <p:style>
+          <a:lnRef idx="0">
+            <a:schemeClr val="accent6"/>
+          </a:lnRef>
+          <a:fillRef idx="3">
+            <a:schemeClr val="accent6"/>
+          </a:fillRef>
+          <a:effectRef idx="3">
+            <a:schemeClr val="accent6"/>
+          </a:effectRef>
+          <a:fontRef idx="minor">
+            <a:schemeClr val="lt1"/>
+          </a:fontRef>
+        </p:style>
+        <p:txBody>
+          <a:bodyPr rtlCol="0" anchor="ctr"/>
+          <a:lstStyle/>
+          <a:p>
+            <a:pPr algn="ctr"/>
+            <a:r>
+              <a:rPr lang="en-IE" dirty="0"/>
+              <a:t>As at…</a:t>
+            </a:r>
+            <a:endParaRPr lang="en-GB" dirty="0"/>
+          </a:p>
+        </p:txBody>
+      </p:sp>
+      <p:sp>
+        <p:nvSpPr>
+          <p:cNvPr id="28" name="Oval 27">
+            <a:extLst>
+              <a:ext uri="{FF2B5EF4-FFF2-40B4-BE49-F238E27FC236}">
+                <a16:creationId xmlns:a16="http://schemas.microsoft.com/office/drawing/2014/main" id="{3FB83945-4339-49C4-9987-C2DF5FFB4939}"/>
+              </a:ext>
+            </a:extLst>
+          </p:cNvPr>
+          <p:cNvSpPr/>
+          <p:nvPr/>
+        </p:nvSpPr>
+        <p:spPr>
+          <a:xfrm rot="900000">
+            <a:off x="1134858" y="4897508"/>
+            <a:ext cx="548478" cy="548478"/>
+          </a:xfrm>
+          <a:prstGeom prst="ellipse">
+            <a:avLst/>
+          </a:prstGeom>
+          <a:solidFill>
+            <a:schemeClr val="accent2">
+              <a:lumMod val="60000"/>
+              <a:lumOff val="40000"/>
+            </a:schemeClr>
+          </a:solidFill>
+          <a:ln w="28575">
+            <a:solidFill>
+              <a:schemeClr val="accent5">
+                <a:lumMod val="50000"/>
+              </a:schemeClr>
+            </a:solidFill>
+          </a:ln>
+        </p:spPr>
+        <p:style>
+          <a:lnRef idx="2">
+            <a:schemeClr val="accent1">
+              <a:shade val="50000"/>
+            </a:schemeClr>
+          </a:lnRef>
+          <a:fillRef idx="1">
+            <a:schemeClr val="accent1"/>
+          </a:fillRef>
+          <a:effectRef idx="0">
+            <a:schemeClr val="accent1"/>
+          </a:effectRef>
+          <a:fontRef idx="minor">
+            <a:schemeClr val="lt1"/>
+          </a:fontRef>
+        </p:style>
+        <p:txBody>
+          <a:bodyPr rtlCol="0" anchor="ctr"/>
+          <a:lstStyle/>
+          <a:p>
+            <a:pPr algn="ctr"/>
+            <a:r>
+              <a:rPr lang="en-IE" dirty="0"/>
+              <a:t>?</a:t>
+            </a:r>
+            <a:endParaRPr lang="en-GB" dirty="0"/>
+          </a:p>
+        </p:txBody>
+      </p:sp>
+    </p:spTree>
+    <p:extLst>
+      <p:ext uri="{BB962C8B-B14F-4D97-AF65-F5344CB8AC3E}">
+        <p14:creationId xmlns:p14="http://schemas.microsoft.com/office/powerpoint/2010/main" val="814026806"/>
+      </p:ext>
+    </p:extLst>
+  </p:cSld>
+  <p:clrMapOvr>
+    <a:masterClrMapping/>
+  </p:clrMapOvr>
+  <p:timing>
+    <p:tnLst>
+      <p:par>
+        <p:cTn id="1" dur="indefinite" restart="never" nodeType="tmRoot">
+          <p:childTnLst>
+            <p:seq concurrent="1" nextAc="seek">
+              <p:cTn id="2" dur="indefinite" nodeType="mainSeq">
+                <p:childTnLst>
+                  <p:par>
+                    <p:cTn id="3" fill="hold">
+                      <p:stCondLst>
+                        <p:cond delay="indefinite"/>
+                      </p:stCondLst>
+                      <p:childTnLst>
+                        <p:par>
+                          <p:cTn id="4" fill="hold">
+                            <p:stCondLst>
+                              <p:cond delay="0"/>
+                            </p:stCondLst>
+                            <p:childTnLst>
+                              <p:par>
+                                <p:cTn id="5" presetID="1" presetClass="entr" presetSubtype="0" fill="hold" grpId="0" nodeType="clickEffect">
+                                  <p:stCondLst>
+                                    <p:cond delay="0"/>
+                                  </p:stCondLst>
+                                  <p:childTnLst>
+                                    <p:set>
+                                      <p:cBhvr>
+                                        <p:cTn id="6" dur="1" fill="hold">
+                                          <p:stCondLst>
+                                            <p:cond delay="0"/>
+                                          </p:stCondLst>
+                                        </p:cTn>
+                                        <p:tgtEl>
+                                          <p:spTgt spid="13"/>
+                                        </p:tgtEl>
+                                        <p:attrNameLst>
+                                          <p:attrName>style.visibility</p:attrName>
+                                        </p:attrNameLst>
+                                      </p:cBhvr>
+                                      <p:to>
+                                        <p:strVal val="visible"/>
+                                      </p:to>
+                                    </p:set>
+                                  </p:childTnLst>
+                                </p:cTn>
+                              </p:par>
+                            </p:childTnLst>
+                          </p:cTn>
+                        </p:par>
+                      </p:childTnLst>
+                    </p:cTn>
+                  </p:par>
+                  <p:par>
+                    <p:cTn id="7" fill="hold">
+                      <p:stCondLst>
+                        <p:cond delay="indefinite"/>
+                      </p:stCondLst>
+                      <p:childTnLst>
+                        <p:par>
+                          <p:cTn id="8" fill="hold">
+                            <p:stCondLst>
+                              <p:cond delay="0"/>
+                            </p:stCondLst>
+                            <p:childTnLst>
+                              <p:par>
+                                <p:cTn id="9" presetID="1" presetClass="entr" presetSubtype="0" fill="hold" grpId="0" nodeType="clickEffect">
+                                  <p:stCondLst>
+                                    <p:cond delay="0"/>
+                                  </p:stCondLst>
+                                  <p:childTnLst>
+                                    <p:set>
+                                      <p:cBhvr>
+                                        <p:cTn id="10" dur="1" fill="hold">
+                                          <p:stCondLst>
+                                            <p:cond delay="0"/>
+                                          </p:stCondLst>
+                                        </p:cTn>
+                                        <p:tgtEl>
+                                          <p:spTgt spid="15"/>
+                                        </p:tgtEl>
+                                        <p:attrNameLst>
+                                          <p:attrName>style.visibility</p:attrName>
+                                        </p:attrNameLst>
+                                      </p:cBhvr>
+                                      <p:to>
+                                        <p:strVal val="visible"/>
+                                      </p:to>
+                                    </p:set>
+                                  </p:childTnLst>
+                                </p:cTn>
+                              </p:par>
+                            </p:childTnLst>
+                          </p:cTn>
+                        </p:par>
+                      </p:childTnLst>
+                    </p:cTn>
+                  </p:par>
+                  <p:par>
+                    <p:cTn id="11" fill="hold">
+                      <p:stCondLst>
+                        <p:cond delay="indefinite"/>
+                      </p:stCondLst>
+                      <p:childTnLst>
+                        <p:par>
+                          <p:cTn id="12" fill="hold">
+                            <p:stCondLst>
+                              <p:cond delay="0"/>
+                            </p:stCondLst>
+                            <p:childTnLst>
+                              <p:par>
+                                <p:cTn id="13" presetID="1" presetClass="entr" presetSubtype="0" fill="hold" grpId="0" nodeType="clickEffect">
+                                  <p:stCondLst>
+                                    <p:cond delay="0"/>
+                                  </p:stCondLst>
+                                  <p:childTnLst>
+                                    <p:set>
+                                      <p:cBhvr>
+                                        <p:cTn id="14" dur="1" fill="hold">
+                                          <p:stCondLst>
+                                            <p:cond delay="0"/>
+                                          </p:stCondLst>
+                                        </p:cTn>
+                                        <p:tgtEl>
+                                          <p:spTgt spid="28"/>
+                                        </p:tgtEl>
+                                        <p:attrNameLst>
+                                          <p:attrName>style.visibility</p:attrName>
+                                        </p:attrNameLst>
+                                      </p:cBhvr>
+                                      <p:to>
+                                        <p:strVal val="visible"/>
+                                      </p:to>
+                                    </p:set>
+                                  </p:childTnLst>
+                                </p:cTn>
+                              </p:par>
+                            </p:childTnLst>
+                          </p:cTn>
+                        </p:par>
+                      </p:childTnLst>
+                    </p:cTn>
+                  </p:par>
+                </p:childTnLst>
+              </p:cTn>
+              <p:prevCondLst>
+                <p:cond evt="onPrev" delay="0">
+                  <p:tgtEl>
+                    <p:sldTgt/>
+                  </p:tgtEl>
+                </p:cond>
+              </p:prevCondLst>
+              <p:nextCondLst>
+                <p:cond evt="onNext" delay="0">
+                  <p:tgtEl>
+                    <p:sldTgt/>
+                  </p:tgtEl>
+                </p:cond>
+              </p:nextCondLst>
+            </p:seq>
+          </p:childTnLst>
+        </p:cTn>
+      </p:par>
+    </p:tnLst>
+    <p:bldLst>
+      <p:bldP spid="13" grpId="0" animBg="1"/>
+      <p:bldP spid="15" grpId="0" animBg="1"/>
+      <p:bldP spid="28" grpId="0" animBg="1"/>
+    </p:bldLst>
+  </p:timing>
+</p:sld>
+</file>
+
+<file path=ppt/slides/slide7.xml><?xml version="1.0" encoding="utf-8"?>
+<p:sld xmlns:a="http://schemas.openxmlformats.org/drawingml/2006/main" xmlns:r="http://schemas.openxmlformats.org/officeDocument/2006/relationships" xmlns:p="http://schemas.openxmlformats.org/presentationml/2006/main">
+  <p:cSld>
+    <p:spTree>
+      <p:nvGrpSpPr>
+        <p:cNvPr id="1" name=""/>
+        <p:cNvGrpSpPr/>
+        <p:nvPr/>
+      </p:nvGrpSpPr>
+      <p:grpSpPr>
+        <a:xfrm>
+          <a:off x="0" y="0"/>
+          <a:ext cx="0" cy="0"/>
+          <a:chOff x="0" y="0"/>
+          <a:chExt cx="0" cy="0"/>
+        </a:xfrm>
+      </p:grpSpPr>
+      <p:sp>
+        <p:nvSpPr>
+          <p:cNvPr id="3" name="&quot;Not Allowed&quot; Symbol 2">
+            <a:extLst>
+              <a:ext uri="{FF2B5EF4-FFF2-40B4-BE49-F238E27FC236}">
+                <a16:creationId xmlns:a16="http://schemas.microsoft.com/office/drawing/2014/main" id="{6D0EF780-65B1-4670-A2F7-060CDA577D92}"/>
+              </a:ext>
+            </a:extLst>
+          </p:cNvPr>
+          <p:cNvSpPr/>
+          <p:nvPr/>
+        </p:nvSpPr>
+        <p:spPr>
+          <a:xfrm>
+            <a:off x="4897396" y="3796110"/>
+            <a:ext cx="575034" cy="575034"/>
+          </a:xfrm>
+          <a:prstGeom prst="noSmoking">
+            <a:avLst/>
+          </a:prstGeom>
+          <a:solidFill>
+            <a:schemeClr val="accent2">
+              <a:lumMod val="60000"/>
+              <a:lumOff val="40000"/>
+            </a:schemeClr>
+          </a:solidFill>
+          <a:ln>
+            <a:solidFill>
+              <a:schemeClr val="accent2">
+                <a:lumMod val="75000"/>
+              </a:schemeClr>
+            </a:solidFill>
+          </a:ln>
+        </p:spPr>
+        <p:style>
+          <a:lnRef idx="2">
+            <a:schemeClr val="accent1">
+              <a:shade val="50000"/>
+            </a:schemeClr>
+          </a:lnRef>
+          <a:fillRef idx="1">
+            <a:schemeClr val="accent1"/>
+          </a:fillRef>
+          <a:effectRef idx="0">
+            <a:schemeClr val="accent1"/>
+          </a:effectRef>
+          <a:fontRef idx="minor">
+            <a:schemeClr val="lt1"/>
+          </a:fontRef>
+        </p:style>
+        <p:txBody>
+          <a:bodyPr rtlCol="0" anchor="ctr"/>
+          <a:lstStyle/>
+          <a:p>
+            <a:pPr algn="ctr"/>
+            <a:endParaRPr lang="en-GB">
+              <a:solidFill>
+                <a:schemeClr val="tx1"/>
+              </a:solidFill>
+            </a:endParaRPr>
+          </a:p>
+        </p:txBody>
+      </p:sp>
+      <p:sp>
+        <p:nvSpPr>
+          <p:cNvPr id="2" name="Title 1">
+            <a:extLst>
+              <a:ext uri="{FF2B5EF4-FFF2-40B4-BE49-F238E27FC236}">
+                <a16:creationId xmlns:a16="http://schemas.microsoft.com/office/drawing/2014/main" id="{A93D67CF-F60A-43DE-B742-EC019B03B8B4}"/>
+              </a:ext>
+            </a:extLst>
+          </p:cNvPr>
+          <p:cNvSpPr>
+            <a:spLocks noGrp="1"/>
+          </p:cNvSpPr>
+          <p:nvPr>
+            <p:ph type="title"/>
+          </p:nvPr>
+        </p:nvSpPr>
+        <p:spPr/>
+        <p:txBody>
+          <a:bodyPr/>
+          <a:lstStyle/>
+          <a:p>
+            <a:r>
+              <a:rPr lang="en-IE" dirty="0"/>
+              <a:t>Solution 4: Look </a:t>
+            </a:r>
+            <a:r>
+              <a:rPr lang="en-IE" b="1" dirty="0"/>
+              <a:t>behind</a:t>
+            </a:r>
+            <a:r>
+              <a:rPr lang="en-IE" dirty="0"/>
+              <a:t> you…</a:t>
+            </a:r>
+            <a:endParaRPr lang="en-GB" dirty="0"/>
+          </a:p>
+        </p:txBody>
+      </p:sp>
+      <p:pic>
+        <p:nvPicPr>
+          <p:cNvPr id="4" name="Picture 3">
+            <a:extLst>
+              <a:ext uri="{FF2B5EF4-FFF2-40B4-BE49-F238E27FC236}">
+                <a16:creationId xmlns:a16="http://schemas.microsoft.com/office/drawing/2014/main" id="{48D4F640-EC03-49A9-9C2A-BDEBC43AABA6}"/>
+              </a:ext>
+            </a:extLst>
+          </p:cNvPr>
+          <p:cNvPicPr>
+            <a:picLocks noChangeAspect="1"/>
+          </p:cNvPicPr>
+          <p:nvPr/>
+        </p:nvPicPr>
+        <p:blipFill>
+          <a:blip r:embed="rId3"/>
+          <a:stretch>
+            <a:fillRect/>
+          </a:stretch>
+        </p:blipFill>
+        <p:spPr>
+          <a:xfrm>
+            <a:off x="10039048" y="161457"/>
+            <a:ext cx="1978023" cy="1732898"/>
+          </a:xfrm>
+          <a:prstGeom prst="rect">
+            <a:avLst/>
+          </a:prstGeom>
+        </p:spPr>
+      </p:pic>
+      <p:sp>
+        <p:nvSpPr>
+          <p:cNvPr id="5" name="Flowchart: Process 4">
+            <a:extLst>
+              <a:ext uri="{FF2B5EF4-FFF2-40B4-BE49-F238E27FC236}">
+                <a16:creationId xmlns:a16="http://schemas.microsoft.com/office/drawing/2014/main" id="{FE497085-156A-4B13-8479-51BAEA4E41D0}"/>
+              </a:ext>
+            </a:extLst>
+          </p:cNvPr>
+          <p:cNvSpPr/>
+          <p:nvPr/>
+        </p:nvSpPr>
+        <p:spPr>
+          <a:xfrm>
+            <a:off x="1582310" y="3236181"/>
+            <a:ext cx="2560320" cy="1325563"/>
+          </a:xfrm>
+          <a:prstGeom prst="flowChartProcess">
+            <a:avLst/>
+          </a:prstGeom>
+        </p:spPr>
+        <p:style>
+          <a:lnRef idx="2">
+            <a:schemeClr val="accent1">
+              <a:shade val="50000"/>
+            </a:schemeClr>
+          </a:lnRef>
+          <a:fillRef idx="1">
+            <a:schemeClr val="accent1"/>
+          </a:fillRef>
+          <a:effectRef idx="0">
+            <a:schemeClr val="accent1"/>
+          </a:effectRef>
+          <a:fontRef idx="minor">
+            <a:schemeClr val="lt1"/>
+          </a:fontRef>
+        </p:style>
+        <p:txBody>
+          <a:bodyPr rtlCol="0" anchor="ctr"/>
+          <a:lstStyle/>
+          <a:p>
+            <a:pPr algn="ctr"/>
+            <a:r>
+              <a:rPr lang="en-IE" dirty="0"/>
+              <a:t>Get state</a:t>
+            </a:r>
+            <a:endParaRPr lang="en-GB" dirty="0"/>
+          </a:p>
+        </p:txBody>
+      </p:sp>
+      <p:sp>
+        <p:nvSpPr>
+          <p:cNvPr id="6" name="Flowchart: Process 5">
+            <a:extLst>
+              <a:ext uri="{FF2B5EF4-FFF2-40B4-BE49-F238E27FC236}">
+                <a16:creationId xmlns:a16="http://schemas.microsoft.com/office/drawing/2014/main" id="{FC052706-ED76-4C1E-9066-1812DA8BFA71}"/>
+              </a:ext>
+            </a:extLst>
+          </p:cNvPr>
+          <p:cNvSpPr/>
+          <p:nvPr/>
+        </p:nvSpPr>
+        <p:spPr>
+          <a:xfrm>
+            <a:off x="6227197" y="3236180"/>
+            <a:ext cx="2560320" cy="1325563"/>
+          </a:xfrm>
+          <a:prstGeom prst="flowChartProcess">
+            <a:avLst/>
+          </a:prstGeom>
+        </p:spPr>
+        <p:style>
+          <a:lnRef idx="2">
+            <a:schemeClr val="accent1">
+              <a:shade val="50000"/>
+            </a:schemeClr>
+          </a:lnRef>
+          <a:fillRef idx="1">
+            <a:schemeClr val="accent1"/>
+          </a:fillRef>
+          <a:effectRef idx="0">
+            <a:schemeClr val="accent1"/>
+          </a:effectRef>
+          <a:fontRef idx="minor">
+            <a:schemeClr val="lt1"/>
+          </a:fontRef>
+        </p:style>
+        <p:txBody>
+          <a:bodyPr rtlCol="0" anchor="ctr"/>
+          <a:lstStyle/>
+          <a:p>
+            <a:pPr algn="ctr"/>
+            <a:r>
+              <a:rPr lang="en-IE" dirty="0"/>
+              <a:t>Act on prior state</a:t>
+            </a:r>
+            <a:endParaRPr lang="en-GB" dirty="0"/>
+          </a:p>
+        </p:txBody>
+      </p:sp>
+      <p:cxnSp>
+        <p:nvCxnSpPr>
+          <p:cNvPr id="7" name="Straight Arrow Connector 6">
+            <a:extLst>
+              <a:ext uri="{FF2B5EF4-FFF2-40B4-BE49-F238E27FC236}">
+                <a16:creationId xmlns:a16="http://schemas.microsoft.com/office/drawing/2014/main" id="{C8DAA702-D810-4E7E-ADC3-E6750E5EDB37}"/>
+              </a:ext>
+            </a:extLst>
+          </p:cNvPr>
+          <p:cNvCxnSpPr>
+            <a:stCxn id="5" idx="3"/>
+            <a:endCxn id="6" idx="1"/>
+          </p:cNvCxnSpPr>
+          <p:nvPr/>
+        </p:nvCxnSpPr>
+        <p:spPr>
+          <a:xfrm flipV="1">
+            <a:off x="4142630" y="3898962"/>
+            <a:ext cx="2084567" cy="1"/>
+          </a:xfrm>
+          <a:prstGeom prst="straightConnector1">
+            <a:avLst/>
+          </a:prstGeom>
+          <a:ln>
+            <a:tailEnd type="triangle"/>
+          </a:ln>
+        </p:spPr>
+        <p:style>
+          <a:lnRef idx="3">
+            <a:schemeClr val="accent5"/>
+          </a:lnRef>
+          <a:fillRef idx="0">
+            <a:schemeClr val="accent5"/>
+          </a:fillRef>
+          <a:effectRef idx="2">
+            <a:schemeClr val="accent5"/>
+          </a:effectRef>
+          <a:fontRef idx="minor">
+            <a:schemeClr val="tx1"/>
+          </a:fontRef>
+        </p:style>
+      </p:cxnSp>
+      <p:sp>
+        <p:nvSpPr>
           <p:cNvPr id="8" name="TextBox 7">
             <a:extLst>
               <a:ext uri="{FF2B5EF4-FFF2-40B4-BE49-F238E27FC236}">
@@ -8668,7 +10233,7 @@
 </p:sld>
 </file>
 
-<file path=ppt/slides/slide7.xml><?xml version="1.0" encoding="utf-8"?>
+<file path=ppt/slides/slide8.xml><?xml version="1.0" encoding="utf-8"?>
 <p:sld xmlns:a="http://schemas.openxmlformats.org/drawingml/2006/main" xmlns:r="http://schemas.openxmlformats.org/officeDocument/2006/relationships" xmlns:p="http://schemas.openxmlformats.org/presentationml/2006/main">
   <p:cSld>
     <p:spTree>
@@ -8856,7 +10421,7 @@
 </p:sld>
 </file>
 
-<file path=ppt/slides/slide8.xml><?xml version="1.0" encoding="utf-8"?>
+<file path=ppt/slides/slide9.xml><?xml version="1.0" encoding="utf-8"?>
 <p:sld xmlns:a="http://schemas.openxmlformats.org/drawingml/2006/main" xmlns:r="http://schemas.openxmlformats.org/officeDocument/2006/relationships" xmlns:p="http://schemas.openxmlformats.org/presentationml/2006/main">
   <p:cSld>
     <p:spTree>
@@ -8873,12 +10438,41 @@
           <a:chExt cx="0" cy="0"/>
         </a:xfrm>
       </p:grpSpPr>
+      <p:sp>
+        <p:nvSpPr>
+          <p:cNvPr id="2" name="Title 1">
+            <a:extLst>
+              <a:ext uri="{FF2B5EF4-FFF2-40B4-BE49-F238E27FC236}">
+                <a16:creationId xmlns:a16="http://schemas.microsoft.com/office/drawing/2014/main" id="{A93D67CF-F60A-43DE-B742-EC019B03B8B4}"/>
+              </a:ext>
+            </a:extLst>
+          </p:cNvPr>
+          <p:cNvSpPr>
+            <a:spLocks noGrp="1"/>
+          </p:cNvSpPr>
+          <p:nvPr>
+            <p:ph type="title"/>
+          </p:nvPr>
+        </p:nvSpPr>
+        <p:spPr/>
+        <p:txBody>
+          <a:bodyPr/>
+          <a:lstStyle/>
+          <a:p>
+            <a:r>
+              <a:rPr lang="en-IE" dirty="0"/>
+              <a:t>Other possibilities</a:t>
+            </a:r>
+            <a:endParaRPr lang="en-GB" dirty="0"/>
+          </a:p>
+        </p:txBody>
+      </p:sp>
       <p:pic>
         <p:nvPicPr>
-          <p:cNvPr id="7" name="Picture 6" descr="Text&#10;&#10;Description automatically generated">
-            <a:extLst>
-              <a:ext uri="{FF2B5EF4-FFF2-40B4-BE49-F238E27FC236}">
-                <a16:creationId xmlns:a16="http://schemas.microsoft.com/office/drawing/2014/main" id="{3BC839DB-92B4-4F0F-A125-FD0B996E7DF5}"/>
+          <p:cNvPr id="4" name="Picture 3">
+            <a:extLst>
+              <a:ext uri="{FF2B5EF4-FFF2-40B4-BE49-F238E27FC236}">
+                <a16:creationId xmlns:a16="http://schemas.microsoft.com/office/drawing/2014/main" id="{48D4F640-EC03-49A9-9C2A-BDEBC43AABA6}"/>
               </a:ext>
             </a:extLst>
           </p:cNvPr>
@@ -8888,80 +10482,27 @@
           <p:nvPr/>
         </p:nvPicPr>
         <p:blipFill>
-          <a:blip r:embed="rId3">
-            <a:extLst>
-              <a:ext uri="{28A0092B-C50C-407E-A947-70E740481C1C}">
-                <a14:useLocalDpi xmlns:a14="http://schemas.microsoft.com/office/drawing/2010/main" val="0"/>
-              </a:ext>
-              <a:ext uri="{837473B0-CC2E-450A-ABE3-18F120FF3D39}">
-                <a1611:picAttrSrcUrl xmlns:a1611="http://schemas.microsoft.com/office/drawing/2016/11/main" r:id="rId4"/>
-              </a:ext>
-            </a:extLst>
-          </a:blip>
+          <a:blip r:embed="rId3"/>
           <a:stretch>
             <a:fillRect/>
           </a:stretch>
         </p:blipFill>
         <p:spPr>
           <a:xfrm>
-            <a:off x="0" y="3104987"/>
-            <a:ext cx="4699867" cy="3630464"/>
+            <a:off x="10039048" y="161457"/>
+            <a:ext cx="1978023" cy="1732898"/>
           </a:xfrm>
           <a:prstGeom prst="rect">
             <a:avLst/>
           </a:prstGeom>
         </p:spPr>
       </p:pic>
-      <p:sp>
-        <p:nvSpPr>
-          <p:cNvPr id="2" name="Title 1">
-            <a:extLst>
-              <a:ext uri="{FF2B5EF4-FFF2-40B4-BE49-F238E27FC236}">
-                <a16:creationId xmlns:a16="http://schemas.microsoft.com/office/drawing/2014/main" id="{A93D67CF-F60A-43DE-B742-EC019B03B8B4}"/>
-              </a:ext>
-            </a:extLst>
-          </p:cNvPr>
-          <p:cNvSpPr>
-            <a:spLocks noGrp="1"/>
-          </p:cNvSpPr>
-          <p:nvPr>
-            <p:ph type="title"/>
-          </p:nvPr>
-        </p:nvSpPr>
-        <p:spPr>
-          <a:xfrm>
-            <a:off x="4130040" y="2074656"/>
-            <a:ext cx="3383943" cy="1932802"/>
-          </a:xfrm>
-        </p:spPr>
-        <p:txBody>
-          <a:bodyPr>
-            <a:normAutofit/>
-          </a:bodyPr>
-          <a:lstStyle/>
-          <a:p>
-            <a:r>
-              <a:rPr lang="en-IE" sz="8800" b="1" dirty="0"/>
-              <a:t>Q</a:t>
-            </a:r>
-            <a:r>
-              <a:rPr lang="en-IE" sz="8800" dirty="0"/>
-              <a:t> &amp; </a:t>
-            </a:r>
-            <a:r>
-              <a:rPr lang="en-IE" sz="8800" b="1" dirty="0"/>
-              <a:t>A</a:t>
-            </a:r>
-            <a:endParaRPr lang="en-GB" sz="8800" b="1" dirty="0"/>
-          </a:p>
-        </p:txBody>
-      </p:sp>
       <p:pic>
         <p:nvPicPr>
-          <p:cNvPr id="4" name="Picture 3">
-            <a:extLst>
-              <a:ext uri="{FF2B5EF4-FFF2-40B4-BE49-F238E27FC236}">
-                <a16:creationId xmlns:a16="http://schemas.microsoft.com/office/drawing/2014/main" id="{48D4F640-EC03-49A9-9C2A-BDEBC43AABA6}"/>
+          <p:cNvPr id="5" name="Picture 4" descr="A picture containing dark, light&#10;&#10;Description automatically generated">
+            <a:extLst>
+              <a:ext uri="{FF2B5EF4-FFF2-40B4-BE49-F238E27FC236}">
+                <a16:creationId xmlns:a16="http://schemas.microsoft.com/office/drawing/2014/main" id="{263EB027-FCAB-4972-B0A5-BC8B033B3817}"/>
               </a:ext>
             </a:extLst>
           </p:cNvPr>
@@ -8971,25 +10512,224 @@
           <p:nvPr/>
         </p:nvPicPr>
         <p:blipFill>
-          <a:blip r:embed="rId5"/>
+          <a:blip r:embed="rId4">
+            <a:extLst>
+              <a:ext uri="{28A0092B-C50C-407E-A947-70E740481C1C}">
+                <a14:useLocalDpi xmlns:a14="http://schemas.microsoft.com/office/drawing/2010/main" val="0"/>
+              </a:ext>
+              <a:ext uri="{837473B0-CC2E-450A-ABE3-18F120FF3D39}">
+                <a1611:picAttrSrcUrl xmlns:a1611="http://schemas.microsoft.com/office/drawing/2016/11/main" r:id="rId5"/>
+              </a:ext>
+            </a:extLst>
+          </a:blip>
           <a:stretch>
             <a:fillRect/>
           </a:stretch>
         </p:blipFill>
         <p:spPr>
           <a:xfrm>
-            <a:off x="10039048" y="161457"/>
-            <a:ext cx="1978023" cy="1732898"/>
+            <a:off x="838200" y="1894355"/>
+            <a:ext cx="851357" cy="601271"/>
           </a:xfrm>
           <a:prstGeom prst="rect">
             <a:avLst/>
           </a:prstGeom>
         </p:spPr>
       </p:pic>
+      <p:sp>
+        <p:nvSpPr>
+          <p:cNvPr id="3" name="TextBox 2">
+            <a:extLst>
+              <a:ext uri="{FF2B5EF4-FFF2-40B4-BE49-F238E27FC236}">
+                <a16:creationId xmlns:a16="http://schemas.microsoft.com/office/drawing/2014/main" id="{1041DFAF-8CFE-4A67-8B83-FFFBF2CE5C60}"/>
+              </a:ext>
+            </a:extLst>
+          </p:cNvPr>
+          <p:cNvSpPr txBox="1"/>
+          <p:nvPr/>
+        </p:nvSpPr>
+        <p:spPr>
+          <a:xfrm>
+            <a:off x="1689557" y="2010324"/>
+            <a:ext cx="1829347" cy="523220"/>
+          </a:xfrm>
+          <a:prstGeom prst="rect">
+            <a:avLst/>
+          </a:prstGeom>
+          <a:noFill/>
+        </p:spPr>
+        <p:txBody>
+          <a:bodyPr wrap="none" rtlCol="0">
+            <a:spAutoFit/>
+          </a:bodyPr>
+          <a:lstStyle/>
+          <a:p>
+            <a:r>
+              <a:rPr lang="en-IE" sz="2800" dirty="0"/>
+              <a:t>Do </a:t>
+            </a:r>
+            <a:r>
+              <a:rPr lang="en-IE" sz="2800" b="1" dirty="0"/>
+              <a:t>nothing</a:t>
+            </a:r>
+            <a:endParaRPr lang="en-GB" sz="2800" dirty="0"/>
+          </a:p>
+        </p:txBody>
+      </p:sp>
+      <p:pic>
+        <p:nvPicPr>
+          <p:cNvPr id="7" name="Picture 6" descr="A picture containing dark, light&#10;&#10;Description automatically generated">
+            <a:extLst>
+              <a:ext uri="{FF2B5EF4-FFF2-40B4-BE49-F238E27FC236}">
+                <a16:creationId xmlns:a16="http://schemas.microsoft.com/office/drawing/2014/main" id="{ADB82995-4362-4E60-8D06-DA3342D530ED}"/>
+              </a:ext>
+            </a:extLst>
+          </p:cNvPr>
+          <p:cNvPicPr>
+            <a:picLocks noChangeAspect="1"/>
+          </p:cNvPicPr>
+          <p:nvPr/>
+        </p:nvPicPr>
+        <p:blipFill>
+          <a:blip r:embed="rId4">
+            <a:extLst>
+              <a:ext uri="{28A0092B-C50C-407E-A947-70E740481C1C}">
+                <a14:useLocalDpi xmlns:a14="http://schemas.microsoft.com/office/drawing/2010/main" val="0"/>
+              </a:ext>
+              <a:ext uri="{837473B0-CC2E-450A-ABE3-18F120FF3D39}">
+                <a1611:picAttrSrcUrl xmlns:a1611="http://schemas.microsoft.com/office/drawing/2016/11/main" r:id="rId5"/>
+              </a:ext>
+            </a:extLst>
+          </a:blip>
+          <a:stretch>
+            <a:fillRect/>
+          </a:stretch>
+        </p:blipFill>
+        <p:spPr>
+          <a:xfrm>
+            <a:off x="838200" y="2904673"/>
+            <a:ext cx="851357" cy="601271"/>
+          </a:xfrm>
+          <a:prstGeom prst="rect">
+            <a:avLst/>
+          </a:prstGeom>
+        </p:spPr>
+      </p:pic>
+      <p:sp>
+        <p:nvSpPr>
+          <p:cNvPr id="8" name="TextBox 7">
+            <a:extLst>
+              <a:ext uri="{FF2B5EF4-FFF2-40B4-BE49-F238E27FC236}">
+                <a16:creationId xmlns:a16="http://schemas.microsoft.com/office/drawing/2014/main" id="{AB52F622-B871-4C2C-BD9D-CEF256AAC9CF}"/>
+              </a:ext>
+            </a:extLst>
+          </p:cNvPr>
+          <p:cNvSpPr txBox="1"/>
+          <p:nvPr/>
+        </p:nvSpPr>
+        <p:spPr>
+          <a:xfrm>
+            <a:off x="1689557" y="2943698"/>
+            <a:ext cx="1982915" cy="523220"/>
+          </a:xfrm>
+          <a:prstGeom prst="rect">
+            <a:avLst/>
+          </a:prstGeom>
+          <a:noFill/>
+        </p:spPr>
+        <p:txBody>
+          <a:bodyPr wrap="none" rtlCol="0">
+            <a:spAutoFit/>
+          </a:bodyPr>
+          <a:lstStyle/>
+          <a:p>
+            <a:r>
+              <a:rPr lang="en-IE" sz="2800" dirty="0"/>
+              <a:t>Actor model</a:t>
+            </a:r>
+            <a:endParaRPr lang="en-GB" sz="2800" dirty="0"/>
+          </a:p>
+        </p:txBody>
+      </p:sp>
+      <p:pic>
+        <p:nvPicPr>
+          <p:cNvPr id="9" name="Picture 8" descr="A picture containing dark, light&#10;&#10;Description automatically generated">
+            <a:extLst>
+              <a:ext uri="{FF2B5EF4-FFF2-40B4-BE49-F238E27FC236}">
+                <a16:creationId xmlns:a16="http://schemas.microsoft.com/office/drawing/2014/main" id="{EC9A099B-B7F4-4842-B562-28F47E7C5DD5}"/>
+              </a:ext>
+            </a:extLst>
+          </p:cNvPr>
+          <p:cNvPicPr>
+            <a:picLocks noChangeAspect="1"/>
+          </p:cNvPicPr>
+          <p:nvPr/>
+        </p:nvPicPr>
+        <p:blipFill>
+          <a:blip r:embed="rId4">
+            <a:extLst>
+              <a:ext uri="{28A0092B-C50C-407E-A947-70E740481C1C}">
+                <a14:useLocalDpi xmlns:a14="http://schemas.microsoft.com/office/drawing/2010/main" val="0"/>
+              </a:ext>
+              <a:ext uri="{837473B0-CC2E-450A-ABE3-18F120FF3D39}">
+                <a1611:picAttrSrcUrl xmlns:a1611="http://schemas.microsoft.com/office/drawing/2016/11/main" r:id="rId5"/>
+              </a:ext>
+            </a:extLst>
+          </a:blip>
+          <a:stretch>
+            <a:fillRect/>
+          </a:stretch>
+        </p:blipFill>
+        <p:spPr>
+          <a:xfrm>
+            <a:off x="838200" y="3914991"/>
+            <a:ext cx="851357" cy="601271"/>
+          </a:xfrm>
+          <a:prstGeom prst="rect">
+            <a:avLst/>
+          </a:prstGeom>
+        </p:spPr>
+      </p:pic>
+      <p:sp>
+        <p:nvSpPr>
+          <p:cNvPr id="10" name="TextBox 9">
+            <a:extLst>
+              <a:ext uri="{FF2B5EF4-FFF2-40B4-BE49-F238E27FC236}">
+                <a16:creationId xmlns:a16="http://schemas.microsoft.com/office/drawing/2014/main" id="{A941411F-EB62-4AD8-A874-A2C3D41C3C62}"/>
+              </a:ext>
+            </a:extLst>
+          </p:cNvPr>
+          <p:cNvSpPr txBox="1"/>
+          <p:nvPr/>
+        </p:nvSpPr>
+        <p:spPr>
+          <a:xfrm>
+            <a:off x="1689557" y="3993042"/>
+            <a:ext cx="1930913" cy="523220"/>
+          </a:xfrm>
+          <a:prstGeom prst="rect">
+            <a:avLst/>
+          </a:prstGeom>
+          <a:noFill/>
+        </p:spPr>
+        <p:txBody>
+          <a:bodyPr wrap="none" rtlCol="0">
+            <a:spAutoFit/>
+          </a:bodyPr>
+          <a:lstStyle/>
+          <a:p>
+            <a:r>
+              <a:rPr lang="en-IE" sz="2800" dirty="0"/>
+              <a:t>Merge state</a:t>
+            </a:r>
+            <a:endParaRPr lang="en-GB" sz="2800" dirty="0"/>
+          </a:p>
+        </p:txBody>
+      </p:sp>
     </p:spTree>
     <p:extLst>
       <p:ext uri="{BB962C8B-B14F-4D97-AF65-F5344CB8AC3E}">
-        <p14:creationId xmlns:p14="http://schemas.microsoft.com/office/powerpoint/2010/main" val="3044768823"/>
+        <p14:creationId xmlns:p14="http://schemas.microsoft.com/office/powerpoint/2010/main" val="2402126796"/>
       </p:ext>
     </p:extLst>
   </p:cSld>

</xml_diff>

<commit_message>
New putative talk and feedback incorporated
</commit_message>
<xml_diff>
--- a/Taming the Concurrency Crocodile.pptx
+++ b/Taming the Concurrency Crocodile.pptx
@@ -5770,7 +5770,7 @@
         <p:spPr>
           <a:xfrm>
             <a:off x="6792513" y="5286103"/>
-            <a:ext cx="1409040" cy="369332"/>
+            <a:ext cx="1181734" cy="369332"/>
           </a:xfrm>
           <a:prstGeom prst="rect">
             <a:avLst/>
@@ -5785,7 +5785,7 @@
           <a:p>
             <a:r>
               <a:rPr lang="en-IE" dirty="0"/>
-              <a:t>&gt;&gt; command</a:t>
+              <a:t>&gt;&gt; append</a:t>
             </a:r>
             <a:endParaRPr lang="en-GB" dirty="0"/>
           </a:p>

</xml_diff>